<commit_message>
completed HTML5 Core presentation
</commit_message>
<xml_diff>
--- a/ModuleTemplate.pptx
+++ b/ModuleTemplate.pptx
@@ -11106,7 +11106,7 @@
                 <a:ea typeface="+mn-ea"/>
                 <a:cs typeface="Arial" charset="0"/>
               </a:rPr>
-              <a:t>Title</a:t>
+              <a:t>HTML5 Core*</a:t>
             </a:r>
             <a:endParaRPr lang="en-US" dirty="0"/>
           </a:p>
@@ -11122,12 +11122,29 @@
             <p:ph type="subTitle" idx="1"/>
           </p:nvPr>
         </p:nvSpPr>
-        <p:spPr/>
+        <p:spPr>
+          <a:xfrm>
+            <a:off x="423334" y="4703875"/>
+            <a:ext cx="8478762" cy="463255"/>
+          </a:xfrm>
+        </p:spPr>
         <p:txBody>
           <a:bodyPr/>
           <a:lstStyle/>
           <a:p>
-            <a:endParaRPr lang="en-US" dirty="0"/>
+            <a:r>
+              <a:rPr lang="en-US" sz="2800" dirty="0" smtClean="0">
+                <a:solidFill>
+                  <a:schemeClr val="accent1"/>
+                </a:solidFill>
+              </a:rPr>
+              <a:t>*Even haters admit these are “HTML5” technologies</a:t>
+            </a:r>
+            <a:endParaRPr lang="en-US" sz="2800" dirty="0">
+              <a:solidFill>
+                <a:schemeClr val="accent1"/>
+              </a:solidFill>
+            </a:endParaRPr>
           </a:p>
         </p:txBody>
       </p:sp>
@@ -11333,7 +11350,7 @@
         <p:spPr>
           <a:xfrm>
             <a:off x="389436" y="1447802"/>
-            <a:ext cx="8363938" cy="451406"/>
+            <a:ext cx="8363938" cy="2618153"/>
           </a:xfrm>
         </p:spPr>
         <p:txBody>
@@ -11342,7 +11359,32 @@
           <a:p>
             <a:r>
               <a:rPr lang="en-US" dirty="0" smtClean="0"/>
-              <a:t>List each technology to be covered	</a:t>
+              <a:t>Semantic Markup</a:t>
+            </a:r>
+          </a:p>
+          <a:p>
+            <a:r>
+              <a:rPr lang="en-US" dirty="0" smtClean="0"/>
+              <a:t>Audio and Video</a:t>
+            </a:r>
+          </a:p>
+          <a:p>
+            <a:r>
+              <a:rPr lang="en-US" dirty="0" err="1" smtClean="0"/>
+              <a:t>Microdata</a:t>
+            </a:r>
+            <a:endParaRPr lang="en-US" dirty="0" smtClean="0"/>
+          </a:p>
+          <a:p>
+            <a:r>
+              <a:rPr lang="en-US" dirty="0" smtClean="0"/>
+              <a:t>Data-*</a:t>
+            </a:r>
+          </a:p>
+          <a:p>
+            <a:r>
+              <a:rPr lang="en-US" dirty="0" smtClean="0"/>
+              <a:t>SVG</a:t>
             </a:r>
             <a:endParaRPr lang="en-US" dirty="0"/>
           </a:p>

</xml_diff>

<commit_message>
doc and pptx updates
</commit_message>
<xml_diff>
--- a/ModuleTemplate.pptx
+++ b/ModuleTemplate.pptx
@@ -203,7 +203,7 @@
           <a:p>
             <a:fld id="{D1EA0DBE-4458-7349-8DB4-B45B1B6487F3}" type="datetimeFigureOut">
               <a:rPr lang="en-US" smtClean="0"/>
-              <a:t>1/3/12</a:t>
+              <a:t>1/9/2012</a:t>
             </a:fld>
             <a:endParaRPr lang="en-US"/>
           </a:p>
@@ -563,6 +563,11 @@
         <a:blipFill dpi="0" rotWithShape="1">
           <a:blip r:embed="rId2">
             <a:lum/>
+            <a:extLst>
+              <a:ext uri="{28A0092B-C50C-407E-A947-70E740481C1C}">
+                <a14:useLocalDpi xmlns:a14="http://schemas.microsoft.com/office/drawing/2010/main"/>
+              </a:ext>
+            </a:extLst>
           </a:blip>
           <a:srcRect/>
           <a:stretch>
@@ -766,13 +771,13 @@
   <p:clrMapOvr>
     <a:masterClrMapping/>
   </p:clrMapOvr>
-  <p:transition xmlns:p14="http://schemas.microsoft.com/office/powerpoint/2010/main">
+  <p:transition>
     <p:fade/>
   </p:transition>
   <p:timing>
     <p:tnLst>
       <p:par>
-        <p:cTn xmlns:p14="http://schemas.microsoft.com/office/powerpoint/2010/main" id="1" dur="indefinite" restart="never" nodeType="tmRoot"/>
+        <p:cTn id="1" dur="indefinite" restart="never" nodeType="tmRoot"/>
       </p:par>
     </p:tnLst>
   </p:timing>
@@ -941,7 +946,7 @@
   <p:clrMapOvr>
     <a:masterClrMapping/>
   </p:clrMapOvr>
-  <p:transition xmlns:p14="http://schemas.microsoft.com/office/powerpoint/2010/main">
+  <p:transition>
     <p:fade/>
   </p:transition>
 </p:sldLayout>
@@ -1241,13 +1246,13 @@
   <p:clrMapOvr>
     <a:masterClrMapping/>
   </p:clrMapOvr>
-  <p:transition xmlns:p14="http://schemas.microsoft.com/office/powerpoint/2010/main">
+  <p:transition>
     <p:fade/>
   </p:transition>
   <p:timing>
     <p:tnLst>
       <p:par>
-        <p:cTn xmlns:p14="http://schemas.microsoft.com/office/powerpoint/2010/main" id="1" dur="indefinite" restart="never" nodeType="tmRoot"/>
+        <p:cTn id="1" dur="indefinite" restart="never" nodeType="tmRoot"/>
       </p:par>
     </p:tnLst>
   </p:timing>
@@ -1660,7 +1665,7 @@
   <p:clrMapOvr>
     <a:masterClrMapping/>
   </p:clrMapOvr>
-  <p:transition xmlns:p14="http://schemas.microsoft.com/office/powerpoint/2010/main">
+  <p:transition>
     <p:fade/>
   </p:transition>
 </p:sldLayout>
@@ -1720,13 +1725,13 @@
   <p:clrMapOvr>
     <a:masterClrMapping/>
   </p:clrMapOvr>
-  <p:transition xmlns:p14="http://schemas.microsoft.com/office/powerpoint/2010/main">
+  <p:transition>
     <p:fade/>
   </p:transition>
   <p:timing>
     <p:tnLst>
       <p:par>
-        <p:cTn xmlns:p14="http://schemas.microsoft.com/office/powerpoint/2010/main" id="1" dur="indefinite" restart="never" nodeType="tmRoot"/>
+        <p:cTn id="1" dur="indefinite" restart="never" nodeType="tmRoot"/>
       </p:par>
     </p:tnLst>
   </p:timing>
@@ -1760,7 +1765,7 @@
   <p:clrMapOvr>
     <a:masterClrMapping/>
   </p:clrMapOvr>
-  <p:transition xmlns:p14="http://schemas.microsoft.com/office/powerpoint/2010/main">
+  <p:transition>
     <p:fade/>
   </p:transition>
 </p:sldLayout>
@@ -1770,60 +1775,6 @@
 <p:sldLayout xmlns:a="http://schemas.openxmlformats.org/drawingml/2006/main" xmlns:r="http://schemas.openxmlformats.org/officeDocument/2006/relationships" xmlns:p="http://schemas.openxmlformats.org/presentationml/2006/main" type="blank" preserve="1">
   <p:cSld name="1_Blank">
     <p:bg>
-      <p:bgPr>
-        <a:blipFill dpi="0" rotWithShape="1">
-          <a:blip r:embed="rId2">
-            <a:lum/>
-          </a:blip>
-          <a:srcRect/>
-          <a:stretch>
-            <a:fillRect/>
-          </a:stretch>
-        </a:blipFill>
-        <a:effectLst/>
-      </p:bgPr>
-    </p:bg>
-    <p:spTree>
-      <p:nvGrpSpPr>
-        <p:cNvPr id="1" name=""/>
-        <p:cNvGrpSpPr/>
-        <p:nvPr/>
-      </p:nvGrpSpPr>
-      <p:grpSpPr>
-        <a:xfrm>
-          <a:off x="0" y="0"/>
-          <a:ext cx="0" cy="0"/>
-          <a:chOff x="0" y="0"/>
-          <a:chExt cx="0" cy="0"/>
-        </a:xfrm>
-      </p:grpSpPr>
-    </p:spTree>
-    <p:extLst>
-      <p:ext uri="{BB962C8B-B14F-4D97-AF65-F5344CB8AC3E}">
-        <p14:creationId xmlns:p14="http://schemas.microsoft.com/office/powerpoint/2010/main" val="602585429"/>
-      </p:ext>
-    </p:extLst>
-  </p:cSld>
-  <p:clrMapOvr>
-    <a:masterClrMapping/>
-  </p:clrMapOvr>
-  <p:transition xmlns:p14="http://schemas.microsoft.com/office/powerpoint/2010/main">
-    <p:fade/>
-  </p:transition>
-  <p:timing>
-    <p:tnLst>
-      <p:par>
-        <p:cTn xmlns:p14="http://schemas.microsoft.com/office/powerpoint/2010/main" id="1" dur="indefinite" restart="never" nodeType="tmRoot"/>
-      </p:par>
-    </p:tnLst>
-  </p:timing>
-</p:sldLayout>
-</file>
-
-<file path=ppt/slideLayouts/slideLayout16.xml><?xml version="1.0" encoding="utf-8"?>
-<p:sldLayout xmlns:a="http://schemas.openxmlformats.org/drawingml/2006/main" xmlns:r="http://schemas.openxmlformats.org/officeDocument/2006/relationships" xmlns:p="http://schemas.openxmlformats.org/presentationml/2006/main" type="blank" preserve="1">
-  <p:cSld name="1_WALKIN - Prints in GRAYSCALE">
-    <p:bg bwMode="ltGray">
       <p:bgPr>
         <a:blipFill dpi="0" rotWithShape="1">
           <a:blip r:embed="rId2">
@@ -1859,27 +1810,27 @@
     </p:spTree>
     <p:extLst>
       <p:ext uri="{BB962C8B-B14F-4D97-AF65-F5344CB8AC3E}">
-        <p14:creationId xmlns:p14="http://schemas.microsoft.com/office/powerpoint/2010/main" val="1296239216"/>
+        <p14:creationId xmlns:p14="http://schemas.microsoft.com/office/powerpoint/2010/main" val="602585429"/>
       </p:ext>
     </p:extLst>
   </p:cSld>
   <p:clrMapOvr>
     <a:masterClrMapping/>
   </p:clrMapOvr>
-  <p:transition xmlns:p14="http://schemas.microsoft.com/office/powerpoint/2010/main">
+  <p:transition>
     <p:fade/>
   </p:transition>
   <p:timing>
     <p:tnLst>
       <p:par>
-        <p:cTn xmlns:p14="http://schemas.microsoft.com/office/powerpoint/2010/main" id="1" dur="indefinite" restart="never" nodeType="tmRoot"/>
+        <p:cTn id="1" dur="indefinite" restart="never" nodeType="tmRoot"/>
       </p:par>
     </p:tnLst>
   </p:timing>
 </p:sldLayout>
 </file>
 
-<file path=ppt/slideLayouts/slideLayout17.xml><?xml version="1.0" encoding="utf-8"?>
+<file path=ppt/slideLayouts/slideLayout16.xml><?xml version="1.0" encoding="utf-8"?>
 <p:sldLayout xmlns:a="http://schemas.openxmlformats.org/drawingml/2006/main" xmlns:r="http://schemas.openxmlformats.org/officeDocument/2006/relationships" xmlns:p="http://schemas.openxmlformats.org/presentationml/2006/main" preserve="1">
   <p:cSld name="Black Layout - Title and Content">
     <p:bg bwMode="black">
@@ -2117,13 +2068,13 @@
   <p:clrMapOvr>
     <a:masterClrMapping/>
   </p:clrMapOvr>
-  <p:transition xmlns:p14="http://schemas.microsoft.com/office/powerpoint/2010/main">
+  <p:transition>
     <p:fade/>
   </p:transition>
 </p:sldLayout>
 </file>
 
-<file path=ppt/slideLayouts/slideLayout18.xml><?xml version="1.0" encoding="utf-8"?>
+<file path=ppt/slideLayouts/slideLayout17.xml><?xml version="1.0" encoding="utf-8"?>
 <p:sldLayout xmlns:a="http://schemas.openxmlformats.org/drawingml/2006/main" xmlns:r="http://schemas.openxmlformats.org/officeDocument/2006/relationships" xmlns:p="http://schemas.openxmlformats.org/presentationml/2006/main" preserve="1">
   <p:cSld name="Black Notes slide Layout">
     <p:bg bwMode="black">
@@ -2413,13 +2364,13 @@
   <p:clrMapOvr>
     <a:masterClrMapping/>
   </p:clrMapOvr>
-  <p:transition xmlns:p14="http://schemas.microsoft.com/office/powerpoint/2010/main">
+  <p:transition>
     <p:fade/>
   </p:transition>
 </p:sldLayout>
 </file>
 
-<file path=ppt/slideLayouts/slideLayout19.xml><?xml version="1.0" encoding="utf-8"?>
+<file path=ppt/slideLayouts/slideLayout18.xml><?xml version="1.0" encoding="utf-8"?>
 <p:sldLayout xmlns:a="http://schemas.openxmlformats.org/drawingml/2006/main" xmlns:r="http://schemas.openxmlformats.org/officeDocument/2006/relationships" xmlns:p="http://schemas.openxmlformats.org/presentationml/2006/main">
   <p:cSld name="Use for slides with Software Code">
     <p:bg>
@@ -2581,13 +2532,193 @@
   <p:clrMapOvr>
     <a:masterClrMapping/>
   </p:clrMapOvr>
-  <p:transition xmlns:p14="http://schemas.microsoft.com/office/powerpoint/2010/main">
+  <p:transition>
     <p:fade/>
   </p:transition>
   <p:timing>
     <p:tnLst>
       <p:par>
-        <p:cTn xmlns:p14="http://schemas.microsoft.com/office/powerpoint/2010/main" id="1" dur="indefinite" restart="never" nodeType="tmRoot"/>
+        <p:cTn id="1" dur="indefinite" restart="never" nodeType="tmRoot"/>
+      </p:par>
+    </p:tnLst>
+  </p:timing>
+</p:sldLayout>
+</file>
+
+<file path=ppt/slideLayouts/slideLayout19.xml><?xml version="1.0" encoding="utf-8"?>
+<p:sldLayout xmlns:a="http://schemas.openxmlformats.org/drawingml/2006/main" xmlns:r="http://schemas.openxmlformats.org/officeDocument/2006/relationships" xmlns:p="http://schemas.openxmlformats.org/presentationml/2006/main" preserve="1">
+  <p:cSld name="Use for slides with Software Code">
+    <p:bg>
+      <p:bgPr>
+        <a:blipFill dpi="0" rotWithShape="1">
+          <a:blip r:embed="rId2">
+            <a:lum/>
+            <a:extLst>
+              <a:ext uri="{28A0092B-C50C-407E-A947-70E740481C1C}">
+                <a14:useLocalDpi xmlns:a14="http://schemas.microsoft.com/office/drawing/2010/main"/>
+              </a:ext>
+            </a:extLst>
+          </a:blip>
+          <a:srcRect/>
+          <a:stretch>
+            <a:fillRect/>
+          </a:stretch>
+        </a:blipFill>
+        <a:effectLst/>
+      </p:bgPr>
+    </p:bg>
+    <p:spTree>
+      <p:nvGrpSpPr>
+        <p:cNvPr id="1" name=""/>
+        <p:cNvGrpSpPr/>
+        <p:nvPr/>
+      </p:nvGrpSpPr>
+      <p:grpSpPr>
+        <a:xfrm>
+          <a:off x="0" y="0"/>
+          <a:ext cx="0" cy="0"/>
+          <a:chOff x="0" y="0"/>
+          <a:chExt cx="0" cy="0"/>
+        </a:xfrm>
+      </p:grpSpPr>
+      <p:sp>
+        <p:nvSpPr>
+          <p:cNvPr id="2" name="Title 1"/>
+          <p:cNvSpPr>
+            <a:spLocks noGrp="1"/>
+          </p:cNvSpPr>
+          <p:nvPr>
+            <p:ph type="title"/>
+          </p:nvPr>
+        </p:nvSpPr>
+        <p:spPr/>
+        <p:txBody>
+          <a:bodyPr/>
+          <a:lstStyle>
+            <a:lvl1pPr>
+              <a:defRPr>
+                <a:solidFill>
+                  <a:schemeClr val="accent1">
+                    <a:alpha val="99000"/>
+                  </a:schemeClr>
+                </a:solidFill>
+              </a:defRPr>
+            </a:lvl1pPr>
+          </a:lstStyle>
+          <a:p>
+            <a:r>
+              <a:rPr lang="en-US" smtClean="0"/>
+              <a:t>Click to edit Master title style</a:t>
+            </a:r>
+            <a:endParaRPr lang="en-US" dirty="0"/>
+          </a:p>
+        </p:txBody>
+      </p:sp>
+      <p:sp>
+        <p:nvSpPr>
+          <p:cNvPr id="6" name="Text Placeholder 5"/>
+          <p:cNvSpPr>
+            <a:spLocks noGrp="1"/>
+          </p:cNvSpPr>
+          <p:nvPr>
+            <p:ph type="body" sz="quarter" idx="10"/>
+          </p:nvPr>
+        </p:nvSpPr>
+        <p:spPr>
+          <a:xfrm>
+            <a:off x="389438" y="1905007"/>
+            <a:ext cx="8363937" cy="2108269"/>
+          </a:xfrm>
+        </p:spPr>
+        <p:txBody>
+          <a:bodyPr/>
+          <a:lstStyle>
+            <a:lvl1pPr>
+              <a:lnSpc>
+                <a:spcPct val="90000"/>
+              </a:lnSpc>
+              <a:defRPr/>
+            </a:lvl1pPr>
+            <a:lvl2pPr>
+              <a:lnSpc>
+                <a:spcPct val="90000"/>
+              </a:lnSpc>
+              <a:defRPr/>
+            </a:lvl2pPr>
+            <a:lvl3pPr>
+              <a:lnSpc>
+                <a:spcPct val="90000"/>
+              </a:lnSpc>
+              <a:defRPr/>
+            </a:lvl3pPr>
+            <a:lvl4pPr>
+              <a:lnSpc>
+                <a:spcPct val="90000"/>
+              </a:lnSpc>
+              <a:defRPr/>
+            </a:lvl4pPr>
+            <a:lvl5pPr>
+              <a:lnSpc>
+                <a:spcPct val="90000"/>
+              </a:lnSpc>
+              <a:defRPr/>
+            </a:lvl5pPr>
+          </a:lstStyle>
+          <a:p>
+            <a:pPr lvl="0"/>
+            <a:r>
+              <a:rPr lang="en-US" smtClean="0"/>
+              <a:t>Click to edit Master text styles</a:t>
+            </a:r>
+          </a:p>
+          <a:p>
+            <a:pPr lvl="1"/>
+            <a:r>
+              <a:rPr lang="en-US" smtClean="0"/>
+              <a:t>Second level</a:t>
+            </a:r>
+          </a:p>
+          <a:p>
+            <a:pPr lvl="2"/>
+            <a:r>
+              <a:rPr lang="en-US" smtClean="0"/>
+              <a:t>Third level</a:t>
+            </a:r>
+          </a:p>
+          <a:p>
+            <a:pPr lvl="3"/>
+            <a:r>
+              <a:rPr lang="en-US" smtClean="0"/>
+              <a:t>Fourth level</a:t>
+            </a:r>
+          </a:p>
+          <a:p>
+            <a:pPr lvl="4"/>
+            <a:r>
+              <a:rPr lang="en-US" smtClean="0"/>
+              <a:t>Fifth level</a:t>
+            </a:r>
+            <a:endParaRPr lang="en-US" dirty="0"/>
+          </a:p>
+        </p:txBody>
+      </p:sp>
+    </p:spTree>
+    <p:extLst>
+      <p:ext uri="{BB962C8B-B14F-4D97-AF65-F5344CB8AC3E}">
+        <p14:creationId xmlns:p14="http://schemas.microsoft.com/office/powerpoint/2010/main" val="2804114289"/>
+      </p:ext>
+    </p:extLst>
+  </p:cSld>
+  <p:clrMapOvr>
+    <a:masterClrMapping/>
+  </p:clrMapOvr>
+  <p:transition>
+    <p:fade/>
+  </p:transition>
+  <p:timing>
+    <p:tnLst>
+      <p:par>
+        <p:cTn id="1" dur="indefinite" restart="never" nodeType="tmRoot"/>
       </p:par>
     </p:tnLst>
   </p:timing>
@@ -2602,6 +2733,11 @@
         <a:blipFill dpi="0" rotWithShape="1">
           <a:blip r:embed="rId2">
             <a:lum/>
+            <a:extLst>
+              <a:ext uri="{28A0092B-C50C-407E-A947-70E740481C1C}">
+                <a14:useLocalDpi xmlns:a14="http://schemas.microsoft.com/office/drawing/2010/main"/>
+              </a:ext>
+            </a:extLst>
           </a:blip>
           <a:srcRect/>
           <a:stretch>
@@ -2863,15 +2999,22 @@
   <p:clrMapOvr>
     <a:masterClrMapping/>
   </p:clrMapOvr>
-  <p:transition xmlns:p14="http://schemas.microsoft.com/office/powerpoint/2010/main">
+  <p:transition>
     <p:fade/>
   </p:transition>
+  <p:timing>
+    <p:tnLst>
+      <p:par>
+        <p:cTn id="1" dur="indefinite" restart="never" nodeType="tmRoot"/>
+      </p:par>
+    </p:tnLst>
+  </p:timing>
 </p:sldLayout>
 </file>
 
 <file path=ppt/slideLayouts/slideLayout20.xml><?xml version="1.0" encoding="utf-8"?>
-<p:sldLayout xmlns:a="http://schemas.openxmlformats.org/drawingml/2006/main" xmlns:r="http://schemas.openxmlformats.org/officeDocument/2006/relationships" xmlns:p="http://schemas.openxmlformats.org/presentationml/2006/main" preserve="1">
-  <p:cSld name="Use for slides with Software Code">
+<p:sldLayout xmlns:a="http://schemas.openxmlformats.org/drawingml/2006/main" xmlns:r="http://schemas.openxmlformats.org/officeDocument/2006/relationships" xmlns:p="http://schemas.openxmlformats.org/presentationml/2006/main" type="title">
+  <p:cSld name="7_Title Slide">
     <p:bg>
       <p:bgPr>
         <a:blipFill dpi="0" rotWithShape="1">
@@ -2882,181 +3025,6 @@
                 <a14:useLocalDpi xmlns:a14="http://schemas.microsoft.com/office/drawing/2010/main"/>
               </a:ext>
             </a:extLst>
-          </a:blip>
-          <a:srcRect/>
-          <a:stretch>
-            <a:fillRect/>
-          </a:stretch>
-        </a:blipFill>
-        <a:effectLst/>
-      </p:bgPr>
-    </p:bg>
-    <p:spTree>
-      <p:nvGrpSpPr>
-        <p:cNvPr id="1" name=""/>
-        <p:cNvGrpSpPr/>
-        <p:nvPr/>
-      </p:nvGrpSpPr>
-      <p:grpSpPr>
-        <a:xfrm>
-          <a:off x="0" y="0"/>
-          <a:ext cx="0" cy="0"/>
-          <a:chOff x="0" y="0"/>
-          <a:chExt cx="0" cy="0"/>
-        </a:xfrm>
-      </p:grpSpPr>
-      <p:sp>
-        <p:nvSpPr>
-          <p:cNvPr id="2" name="Title 1"/>
-          <p:cNvSpPr>
-            <a:spLocks noGrp="1"/>
-          </p:cNvSpPr>
-          <p:nvPr>
-            <p:ph type="title"/>
-          </p:nvPr>
-        </p:nvSpPr>
-        <p:spPr/>
-        <p:txBody>
-          <a:bodyPr/>
-          <a:lstStyle>
-            <a:lvl1pPr>
-              <a:defRPr>
-                <a:solidFill>
-                  <a:schemeClr val="accent1">
-                    <a:alpha val="99000"/>
-                  </a:schemeClr>
-                </a:solidFill>
-              </a:defRPr>
-            </a:lvl1pPr>
-          </a:lstStyle>
-          <a:p>
-            <a:r>
-              <a:rPr lang="en-US" smtClean="0"/>
-              <a:t>Click to edit Master title style</a:t>
-            </a:r>
-            <a:endParaRPr lang="en-US" dirty="0"/>
-          </a:p>
-        </p:txBody>
-      </p:sp>
-      <p:sp>
-        <p:nvSpPr>
-          <p:cNvPr id="6" name="Text Placeholder 5"/>
-          <p:cNvSpPr>
-            <a:spLocks noGrp="1"/>
-          </p:cNvSpPr>
-          <p:nvPr>
-            <p:ph type="body" sz="quarter" idx="10"/>
-          </p:nvPr>
-        </p:nvSpPr>
-        <p:spPr>
-          <a:xfrm>
-            <a:off x="389438" y="1905007"/>
-            <a:ext cx="8363937" cy="2108269"/>
-          </a:xfrm>
-        </p:spPr>
-        <p:txBody>
-          <a:bodyPr/>
-          <a:lstStyle>
-            <a:lvl1pPr>
-              <a:lnSpc>
-                <a:spcPct val="90000"/>
-              </a:lnSpc>
-              <a:defRPr/>
-            </a:lvl1pPr>
-            <a:lvl2pPr>
-              <a:lnSpc>
-                <a:spcPct val="90000"/>
-              </a:lnSpc>
-              <a:defRPr/>
-            </a:lvl2pPr>
-            <a:lvl3pPr>
-              <a:lnSpc>
-                <a:spcPct val="90000"/>
-              </a:lnSpc>
-              <a:defRPr/>
-            </a:lvl3pPr>
-            <a:lvl4pPr>
-              <a:lnSpc>
-                <a:spcPct val="90000"/>
-              </a:lnSpc>
-              <a:defRPr/>
-            </a:lvl4pPr>
-            <a:lvl5pPr>
-              <a:lnSpc>
-                <a:spcPct val="90000"/>
-              </a:lnSpc>
-              <a:defRPr/>
-            </a:lvl5pPr>
-          </a:lstStyle>
-          <a:p>
-            <a:pPr lvl="0"/>
-            <a:r>
-              <a:rPr lang="en-US" smtClean="0"/>
-              <a:t>Click to edit Master text styles</a:t>
-            </a:r>
-          </a:p>
-          <a:p>
-            <a:pPr lvl="1"/>
-            <a:r>
-              <a:rPr lang="en-US" smtClean="0"/>
-              <a:t>Second level</a:t>
-            </a:r>
-          </a:p>
-          <a:p>
-            <a:pPr lvl="2"/>
-            <a:r>
-              <a:rPr lang="en-US" smtClean="0"/>
-              <a:t>Third level</a:t>
-            </a:r>
-          </a:p>
-          <a:p>
-            <a:pPr lvl="3"/>
-            <a:r>
-              <a:rPr lang="en-US" smtClean="0"/>
-              <a:t>Fourth level</a:t>
-            </a:r>
-          </a:p>
-          <a:p>
-            <a:pPr lvl="4"/>
-            <a:r>
-              <a:rPr lang="en-US" smtClean="0"/>
-              <a:t>Fifth level</a:t>
-            </a:r>
-            <a:endParaRPr lang="en-US" dirty="0"/>
-          </a:p>
-        </p:txBody>
-      </p:sp>
-    </p:spTree>
-    <p:extLst>
-      <p:ext uri="{BB962C8B-B14F-4D97-AF65-F5344CB8AC3E}">
-        <p14:creationId xmlns:p14="http://schemas.microsoft.com/office/powerpoint/2010/main" val="2804114289"/>
-      </p:ext>
-    </p:extLst>
-  </p:cSld>
-  <p:clrMapOvr>
-    <a:masterClrMapping/>
-  </p:clrMapOvr>
-  <p:transition xmlns:p14="http://schemas.microsoft.com/office/powerpoint/2010/main">
-    <p:fade/>
-  </p:transition>
-  <p:timing>
-    <p:tnLst>
-      <p:par>
-        <p:cTn xmlns:p14="http://schemas.microsoft.com/office/powerpoint/2010/main" id="1" dur="indefinite" restart="never" nodeType="tmRoot"/>
-      </p:par>
-    </p:tnLst>
-  </p:timing>
-</p:sldLayout>
-</file>
-
-<file path=ppt/slideLayouts/slideLayout21.xml><?xml version="1.0" encoding="utf-8"?>
-<p:sldLayout xmlns:a="http://schemas.openxmlformats.org/drawingml/2006/main" xmlns:r="http://schemas.openxmlformats.org/officeDocument/2006/relationships" xmlns:p="http://schemas.openxmlformats.org/presentationml/2006/main" type="title">
-  <p:cSld name="7_Title Slide">
-    <p:bg>
-      <p:bgPr>
-        <a:blipFill dpi="0" rotWithShape="1">
-          <a:blip r:embed="rId2">
-            <a:lum/>
           </a:blip>
           <a:srcRect/>
           <a:stretch>
@@ -3260,20 +3228,20 @@
   <p:clrMapOvr>
     <a:masterClrMapping/>
   </p:clrMapOvr>
-  <p:transition xmlns:p14="http://schemas.microsoft.com/office/powerpoint/2010/main">
+  <p:transition>
     <p:fade/>
   </p:transition>
   <p:timing>
     <p:tnLst>
       <p:par>
-        <p:cTn xmlns:p14="http://schemas.microsoft.com/office/powerpoint/2010/main" id="1" dur="indefinite" restart="never" nodeType="tmRoot"/>
+        <p:cTn id="1" dur="indefinite" restart="never" nodeType="tmRoot"/>
       </p:par>
     </p:tnLst>
   </p:timing>
 </p:sldLayout>
 </file>
 
-<file path=ppt/slideLayouts/slideLayout22.xml><?xml version="1.0" encoding="utf-8"?>
+<file path=ppt/slideLayouts/slideLayout21.xml><?xml version="1.0" encoding="utf-8"?>
 <p:sldLayout xmlns:a="http://schemas.openxmlformats.org/drawingml/2006/main" xmlns:r="http://schemas.openxmlformats.org/officeDocument/2006/relationships" xmlns:p="http://schemas.openxmlformats.org/presentationml/2006/main" type="title" preserve="1">
   <p:cSld name="7_Title Slide">
     <p:bg>
@@ -3281,6 +3249,11 @@
         <a:blipFill dpi="0" rotWithShape="1">
           <a:blip r:embed="rId2">
             <a:lum/>
+            <a:extLst>
+              <a:ext uri="{28A0092B-C50C-407E-A947-70E740481C1C}">
+                <a14:useLocalDpi xmlns:a14="http://schemas.microsoft.com/office/drawing/2010/main"/>
+              </a:ext>
+            </a:extLst>
           </a:blip>
           <a:srcRect/>
           <a:stretch>
@@ -3484,20 +3457,20 @@
   <p:clrMapOvr>
     <a:masterClrMapping/>
   </p:clrMapOvr>
-  <p:transition xmlns:p14="http://schemas.microsoft.com/office/powerpoint/2010/main">
+  <p:transition>
     <p:fade/>
   </p:transition>
   <p:timing>
     <p:tnLst>
       <p:par>
-        <p:cTn xmlns:p14="http://schemas.microsoft.com/office/powerpoint/2010/main" id="1" dur="indefinite" restart="never" nodeType="tmRoot"/>
+        <p:cTn id="1" dur="indefinite" restart="never" nodeType="tmRoot"/>
       </p:par>
     </p:tnLst>
   </p:timing>
 </p:sldLayout>
 </file>
 
-<file path=ppt/slideLayouts/slideLayout23.xml><?xml version="1.0" encoding="utf-8"?>
+<file path=ppt/slideLayouts/slideLayout22.xml><?xml version="1.0" encoding="utf-8"?>
 <p:sldLayout xmlns:a="http://schemas.openxmlformats.org/drawingml/2006/main" xmlns:r="http://schemas.openxmlformats.org/officeDocument/2006/relationships" xmlns:p="http://schemas.openxmlformats.org/presentationml/2006/main" preserve="1">
   <p:cSld name="1_Demo, Video etc. &quot;special&quot; slides">
     <p:bg>
@@ -3505,6 +3478,11 @@
         <a:blipFill dpi="0" rotWithShape="1">
           <a:blip r:embed="rId2">
             <a:lum/>
+            <a:extLst>
+              <a:ext uri="{28A0092B-C50C-407E-A947-70E740481C1C}">
+                <a14:useLocalDpi xmlns:a14="http://schemas.microsoft.com/office/drawing/2010/main"/>
+              </a:ext>
+            </a:extLst>
           </a:blip>
           <a:srcRect/>
           <a:stretch>
@@ -3766,13 +3744,13 @@
   <p:clrMapOvr>
     <a:masterClrMapping/>
   </p:clrMapOvr>
-  <p:transition xmlns:p14="http://schemas.microsoft.com/office/powerpoint/2010/main">
+  <p:transition>
     <p:fade/>
   </p:transition>
 </p:sldLayout>
 </file>
 
-<file path=ppt/slideLayouts/slideLayout24.xml><?xml version="1.0" encoding="utf-8"?>
+<file path=ppt/slideLayouts/slideLayout23.xml><?xml version="1.0" encoding="utf-8"?>
 <p:sldLayout xmlns:a="http://schemas.openxmlformats.org/drawingml/2006/main" xmlns:r="http://schemas.openxmlformats.org/officeDocument/2006/relationships" xmlns:p="http://schemas.openxmlformats.org/presentationml/2006/main" preserve="1">
   <p:cSld name="3_Demo, Video etc. &quot;special&quot; slides">
     <p:bg>
@@ -3780,6 +3758,11 @@
         <a:blipFill dpi="0" rotWithShape="1">
           <a:blip r:embed="rId2">
             <a:lum/>
+            <a:extLst>
+              <a:ext uri="{28A0092B-C50C-407E-A947-70E740481C1C}">
+                <a14:useLocalDpi xmlns:a14="http://schemas.microsoft.com/office/drawing/2010/main"/>
+              </a:ext>
+            </a:extLst>
           </a:blip>
           <a:srcRect/>
           <a:stretch>
@@ -4041,13 +4024,13 @@
   <p:clrMapOvr>
     <a:masterClrMapping/>
   </p:clrMapOvr>
-  <p:transition xmlns:p14="http://schemas.microsoft.com/office/powerpoint/2010/main">
+  <p:transition>
     <p:fade/>
   </p:transition>
 </p:sldLayout>
 </file>
 
-<file path=ppt/slideLayouts/slideLayout25.xml><?xml version="1.0" encoding="utf-8"?>
+<file path=ppt/slideLayouts/slideLayout24.xml><?xml version="1.0" encoding="utf-8"?>
 <p:sldLayout xmlns:a="http://schemas.openxmlformats.org/drawingml/2006/main" xmlns:r="http://schemas.openxmlformats.org/officeDocument/2006/relationships" xmlns:p="http://schemas.openxmlformats.org/presentationml/2006/main" preserve="1">
   <p:cSld name="2_Demo, Video etc. &quot;special&quot; slides">
     <p:bg>
@@ -4055,6 +4038,11 @@
         <a:blipFill dpi="0" rotWithShape="1">
           <a:blip r:embed="rId2">
             <a:lum/>
+            <a:extLst>
+              <a:ext uri="{28A0092B-C50C-407E-A947-70E740481C1C}">
+                <a14:useLocalDpi xmlns:a14="http://schemas.microsoft.com/office/drawing/2010/main"/>
+              </a:ext>
+            </a:extLst>
           </a:blip>
           <a:srcRect/>
           <a:stretch>
@@ -4316,13 +4304,13 @@
   <p:clrMapOvr>
     <a:masterClrMapping/>
   </p:clrMapOvr>
-  <p:transition xmlns:p14="http://schemas.microsoft.com/office/powerpoint/2010/main">
+  <p:transition>
     <p:fade/>
   </p:transition>
 </p:sldLayout>
 </file>
 
-<file path=ppt/slideLayouts/slideLayout26.xml><?xml version="1.0" encoding="utf-8"?>
+<file path=ppt/slideLayouts/slideLayout25.xml><?xml version="1.0" encoding="utf-8"?>
 <p:sldLayout xmlns:a="http://schemas.openxmlformats.org/drawingml/2006/main" xmlns:r="http://schemas.openxmlformats.org/officeDocument/2006/relationships" xmlns:p="http://schemas.openxmlformats.org/presentationml/2006/main" preserve="1">
   <p:cSld name="4_Demo, Video etc. &quot;special&quot; slides">
     <p:bg>
@@ -4330,6 +4318,11 @@
         <a:blipFill dpi="0" rotWithShape="1">
           <a:blip r:embed="rId2">
             <a:lum/>
+            <a:extLst>
+              <a:ext uri="{28A0092B-C50C-407E-A947-70E740481C1C}">
+                <a14:useLocalDpi xmlns:a14="http://schemas.microsoft.com/office/drawing/2010/main"/>
+              </a:ext>
+            </a:extLst>
           </a:blip>
           <a:srcRect/>
           <a:stretch>
@@ -4591,13 +4584,13 @@
   <p:clrMapOvr>
     <a:masterClrMapping/>
   </p:clrMapOvr>
-  <p:transition xmlns:p14="http://schemas.microsoft.com/office/powerpoint/2010/main">
+  <p:transition>
     <p:fade/>
   </p:transition>
 </p:sldLayout>
 </file>
 
-<file path=ppt/slideLayouts/slideLayout27.xml><?xml version="1.0" encoding="utf-8"?>
+<file path=ppt/slideLayouts/slideLayout26.xml><?xml version="1.0" encoding="utf-8"?>
 <p:sldLayout xmlns:a="http://schemas.openxmlformats.org/drawingml/2006/main" xmlns:r="http://schemas.openxmlformats.org/officeDocument/2006/relationships" xmlns:p="http://schemas.openxmlformats.org/presentationml/2006/main" preserve="1">
   <p:cSld name="5_Demo, Video etc. &quot;special&quot; slides">
     <p:bg>
@@ -4605,6 +4598,11 @@
         <a:blipFill dpi="0" rotWithShape="1">
           <a:blip r:embed="rId2">
             <a:lum/>
+            <a:extLst>
+              <a:ext uri="{28A0092B-C50C-407E-A947-70E740481C1C}">
+                <a14:useLocalDpi xmlns:a14="http://schemas.microsoft.com/office/drawing/2010/main"/>
+              </a:ext>
+            </a:extLst>
           </a:blip>
           <a:srcRect/>
           <a:stretch>
@@ -4866,13 +4864,13 @@
   <p:clrMapOvr>
     <a:masterClrMapping/>
   </p:clrMapOvr>
-  <p:transition xmlns:p14="http://schemas.microsoft.com/office/powerpoint/2010/main">
+  <p:transition>
     <p:fade/>
   </p:transition>
 </p:sldLayout>
 </file>
 
-<file path=ppt/slideLayouts/slideLayout28.xml><?xml version="1.0" encoding="utf-8"?>
+<file path=ppt/slideLayouts/slideLayout27.xml><?xml version="1.0" encoding="utf-8"?>
 <p:sldLayout xmlns:a="http://schemas.openxmlformats.org/drawingml/2006/main" xmlns:r="http://schemas.openxmlformats.org/officeDocument/2006/relationships" xmlns:p="http://schemas.openxmlformats.org/presentationml/2006/main" preserve="1">
   <p:cSld name="6_Demo, Video etc. &quot;special&quot; slides">
     <p:bg>
@@ -4880,6 +4878,11 @@
         <a:blipFill dpi="0" rotWithShape="1">
           <a:blip r:embed="rId2">
             <a:lum/>
+            <a:extLst>
+              <a:ext uri="{28A0092B-C50C-407E-A947-70E740481C1C}">
+                <a14:useLocalDpi xmlns:a14="http://schemas.microsoft.com/office/drawing/2010/main"/>
+              </a:ext>
+            </a:extLst>
           </a:blip>
           <a:srcRect/>
           <a:stretch>
@@ -5141,13 +5144,13 @@
   <p:clrMapOvr>
     <a:masterClrMapping/>
   </p:clrMapOvr>
-  <p:transition xmlns:p14="http://schemas.microsoft.com/office/powerpoint/2010/main">
+  <p:transition>
     <p:fade/>
   </p:transition>
 </p:sldLayout>
 </file>
 
-<file path=ppt/slideLayouts/slideLayout29.xml><?xml version="1.0" encoding="utf-8"?>
+<file path=ppt/slideLayouts/slideLayout28.xml><?xml version="1.0" encoding="utf-8"?>
 <p:sldLayout xmlns:a="http://schemas.openxmlformats.org/drawingml/2006/main" xmlns:r="http://schemas.openxmlformats.org/officeDocument/2006/relationships" xmlns:p="http://schemas.openxmlformats.org/presentationml/2006/main" preserve="1">
   <p:cSld name="1_Title and Content">
     <p:spTree>
@@ -5263,288 +5266,13 @@
   <p:clrMapOvr>
     <a:masterClrMapping/>
   </p:clrMapOvr>
-  <p:transition xmlns:p14="http://schemas.microsoft.com/office/powerpoint/2010/main">
+  <p:transition>
     <p:fade/>
   </p:transition>
 </p:sldLayout>
 </file>
 
-<file path=ppt/slideLayouts/slideLayout3.xml><?xml version="1.0" encoding="utf-8"?>
-<p:sldLayout xmlns:a="http://schemas.openxmlformats.org/drawingml/2006/main" xmlns:r="http://schemas.openxmlformats.org/officeDocument/2006/relationships" xmlns:p="http://schemas.openxmlformats.org/presentationml/2006/main" preserve="1">
-  <p:cSld name="3_Demo, Video etc. &quot;special&quot; slides">
-    <p:bg>
-      <p:bgPr>
-        <a:blipFill dpi="0" rotWithShape="1">
-          <a:blip r:embed="rId2">
-            <a:lum/>
-          </a:blip>
-          <a:srcRect/>
-          <a:stretch>
-            <a:fillRect/>
-          </a:stretch>
-        </a:blipFill>
-        <a:effectLst/>
-      </p:bgPr>
-    </p:bg>
-    <p:spTree>
-      <p:nvGrpSpPr>
-        <p:cNvPr id="1" name=""/>
-        <p:cNvGrpSpPr/>
-        <p:nvPr/>
-      </p:nvGrpSpPr>
-      <p:grpSpPr>
-        <a:xfrm>
-          <a:off x="0" y="0"/>
-          <a:ext cx="0" cy="0"/>
-          <a:chOff x="0" y="0"/>
-          <a:chExt cx="0" cy="0"/>
-        </a:xfrm>
-      </p:grpSpPr>
-      <p:sp>
-        <p:nvSpPr>
-          <p:cNvPr id="2" name="Title 1"/>
-          <p:cNvSpPr>
-            <a:spLocks noGrp="1"/>
-          </p:cNvSpPr>
-          <p:nvPr>
-            <p:ph type="ctrTitle"/>
-          </p:nvPr>
-        </p:nvSpPr>
-        <p:spPr>
-          <a:xfrm>
-            <a:off x="627623" y="2455047"/>
-            <a:ext cx="6994362" cy="1523494"/>
-          </a:xfrm>
-        </p:spPr>
-        <p:txBody>
-          <a:bodyPr anchor="ctr" anchorCtr="0">
-            <a:noAutofit/>
-          </a:bodyPr>
-          <a:lstStyle>
-            <a:lvl1pPr>
-              <a:lnSpc>
-                <a:spcPct val="90000"/>
-              </a:lnSpc>
-              <a:defRPr sz="4800"/>
-            </a:lvl1pPr>
-          </a:lstStyle>
-          <a:p>
-            <a:r>
-              <a:rPr lang="en-US" smtClean="0"/>
-              <a:t>Click to edit Master title style</a:t>
-            </a:r>
-            <a:endParaRPr lang="en-US" dirty="0"/>
-          </a:p>
-        </p:txBody>
-      </p:sp>
-      <p:sp>
-        <p:nvSpPr>
-          <p:cNvPr id="3" name="Subtitle 2"/>
-          <p:cNvSpPr>
-            <a:spLocks noGrp="1"/>
-          </p:cNvSpPr>
-          <p:nvPr>
-            <p:ph type="subTitle" idx="1"/>
-          </p:nvPr>
-        </p:nvSpPr>
-        <p:spPr>
-          <a:xfrm>
-            <a:off x="627624" y="4189146"/>
-            <a:ext cx="6994363" cy="461665"/>
-          </a:xfrm>
-        </p:spPr>
-        <p:txBody>
-          <a:bodyPr>
-            <a:noAutofit/>
-          </a:bodyPr>
-          <a:lstStyle>
-            <a:lvl1pPr marL="0" indent="0" algn="l">
-              <a:lnSpc>
-                <a:spcPct val="90000"/>
-              </a:lnSpc>
-              <a:spcBef>
-                <a:spcPts val="0"/>
-              </a:spcBef>
-              <a:buNone/>
-              <a:defRPr>
-                <a:gradFill>
-                  <a:gsLst>
-                    <a:gs pos="0">
-                      <a:schemeClr val="tx1"/>
-                    </a:gs>
-                    <a:gs pos="86000">
-                      <a:schemeClr val="tx1"/>
-                    </a:gs>
-                  </a:gsLst>
-                  <a:lin ang="5400000" scaled="0"/>
-                </a:gradFill>
-              </a:defRPr>
-            </a:lvl1pPr>
-            <a:lvl2pPr marL="457182" indent="0" algn="ctr">
-              <a:buNone/>
-              <a:defRPr>
-                <a:solidFill>
-                  <a:schemeClr val="tx1">
-                    <a:tint val="75000"/>
-                  </a:schemeClr>
-                </a:solidFill>
-              </a:defRPr>
-            </a:lvl2pPr>
-            <a:lvl3pPr marL="914363" indent="0" algn="ctr">
-              <a:buNone/>
-              <a:defRPr>
-                <a:solidFill>
-                  <a:schemeClr val="tx1">
-                    <a:tint val="75000"/>
-                  </a:schemeClr>
-                </a:solidFill>
-              </a:defRPr>
-            </a:lvl3pPr>
-            <a:lvl4pPr marL="1371545" indent="0" algn="ctr">
-              <a:buNone/>
-              <a:defRPr>
-                <a:solidFill>
-                  <a:schemeClr val="tx1">
-                    <a:tint val="75000"/>
-                  </a:schemeClr>
-                </a:solidFill>
-              </a:defRPr>
-            </a:lvl4pPr>
-            <a:lvl5pPr marL="1828727" indent="0" algn="ctr">
-              <a:buNone/>
-              <a:defRPr>
-                <a:solidFill>
-                  <a:schemeClr val="tx1">
-                    <a:tint val="75000"/>
-                  </a:schemeClr>
-                </a:solidFill>
-              </a:defRPr>
-            </a:lvl5pPr>
-            <a:lvl6pPr marL="2285909" indent="0" algn="ctr">
-              <a:buNone/>
-              <a:defRPr>
-                <a:solidFill>
-                  <a:schemeClr val="tx1">
-                    <a:tint val="75000"/>
-                  </a:schemeClr>
-                </a:solidFill>
-              </a:defRPr>
-            </a:lvl6pPr>
-            <a:lvl7pPr marL="2743090" indent="0" algn="ctr">
-              <a:buNone/>
-              <a:defRPr>
-                <a:solidFill>
-                  <a:schemeClr val="tx1">
-                    <a:tint val="75000"/>
-                  </a:schemeClr>
-                </a:solidFill>
-              </a:defRPr>
-            </a:lvl7pPr>
-            <a:lvl8pPr marL="3200272" indent="0" algn="ctr">
-              <a:buNone/>
-              <a:defRPr>
-                <a:solidFill>
-                  <a:schemeClr val="tx1">
-                    <a:tint val="75000"/>
-                  </a:schemeClr>
-                </a:solidFill>
-              </a:defRPr>
-            </a:lvl8pPr>
-            <a:lvl9pPr marL="3657454" indent="0" algn="ctr">
-              <a:buNone/>
-              <a:defRPr>
-                <a:solidFill>
-                  <a:schemeClr val="tx1">
-                    <a:tint val="75000"/>
-                  </a:schemeClr>
-                </a:solidFill>
-              </a:defRPr>
-            </a:lvl9pPr>
-          </a:lstStyle>
-          <a:p>
-            <a:r>
-              <a:rPr lang="en-US" smtClean="0"/>
-              <a:t>Click to edit Master subtitle style</a:t>
-            </a:r>
-            <a:endParaRPr lang="en-US" dirty="0"/>
-          </a:p>
-        </p:txBody>
-      </p:sp>
-      <p:sp>
-        <p:nvSpPr>
-          <p:cNvPr id="4" name="Text Placeholder 6"/>
-          <p:cNvSpPr>
-            <a:spLocks noGrp="1"/>
-          </p:cNvSpPr>
-          <p:nvPr>
-            <p:ph type="body" sz="quarter" idx="10" hasCustomPrompt="1"/>
-          </p:nvPr>
-        </p:nvSpPr>
-        <p:spPr>
-          <a:xfrm>
-            <a:off x="799118" y="4876800"/>
-            <a:ext cx="7683914" cy="1378644"/>
-          </a:xfrm>
-        </p:spPr>
-        <p:txBody>
-          <a:bodyPr anchor="t" anchorCtr="0">
-            <a:noAutofit/>
-            <a:scene3d>
-              <a:camera prst="orthographicFront"/>
-              <a:lightRig rig="flat" dir="t"/>
-            </a:scene3d>
-            <a:sp3d>
-              <a:contourClr>
-                <a:schemeClr val="tx2"/>
-              </a:contourClr>
-            </a:sp3d>
-          </a:bodyPr>
-          <a:lstStyle>
-            <a:lvl1pPr marL="0" indent="0" algn="r">
-              <a:buFont typeface="Arial" pitchFamily="34" charset="0"/>
-              <a:buNone/>
-              <a:defRPr kumimoji="0" lang="en-US" sz="10000" b="0" i="1" u="none" strike="noStrike" kern="1200" cap="none" spc="-642" normalizeH="0" baseline="0" noProof="0" dirty="0" smtClean="0">
-                <a:ln w="11430"/>
-                <a:solidFill>
-                  <a:schemeClr val="accent1">
-                    <a:alpha val="99000"/>
-                  </a:schemeClr>
-                </a:solidFill>
-                <a:effectLst/>
-                <a:uLnTx/>
-                <a:uFillTx/>
-                <a:latin typeface="+mj-lt"/>
-                <a:ea typeface="+mn-ea"/>
-                <a:cs typeface="+mn-cs"/>
-              </a:defRPr>
-            </a:lvl1pPr>
-          </a:lstStyle>
-          <a:p>
-            <a:pPr lvl="0"/>
-            <a:r>
-              <a:rPr lang="en-US" dirty="0" smtClean="0"/>
-              <a:t>click to…</a:t>
-            </a:r>
-          </a:p>
-        </p:txBody>
-      </p:sp>
-    </p:spTree>
-    <p:extLst>
-      <p:ext uri="{BB962C8B-B14F-4D97-AF65-F5344CB8AC3E}">
-        <p14:creationId xmlns:p14="http://schemas.microsoft.com/office/powerpoint/2010/main" val="4159477088"/>
-      </p:ext>
-    </p:extLst>
-  </p:cSld>
-  <p:clrMapOvr>
-    <a:masterClrMapping/>
-  </p:clrMapOvr>
-  <p:transition xmlns:p14="http://schemas.microsoft.com/office/powerpoint/2010/main">
-    <p:fade/>
-  </p:transition>
-</p:sldLayout>
-</file>
-
-<file path=ppt/slideLayouts/slideLayout30.xml><?xml version="1.0" encoding="utf-8"?>
+<file path=ppt/slideLayouts/slideLayout29.xml><?xml version="1.0" encoding="utf-8"?>
 <p:sldLayout xmlns:a="http://schemas.openxmlformats.org/drawingml/2006/main" xmlns:r="http://schemas.openxmlformats.org/officeDocument/2006/relationships" xmlns:p="http://schemas.openxmlformats.org/presentationml/2006/main" preserve="1">
   <p:cSld name="4_Title and Content">
     <p:bg>
@@ -5715,13 +5443,293 @@
   <p:clrMapOvr>
     <a:masterClrMapping/>
   </p:clrMapOvr>
-  <p:transition xmlns:p14="http://schemas.microsoft.com/office/powerpoint/2010/main">
+  <p:transition>
     <p:fade/>
   </p:transition>
 </p:sldLayout>
 </file>
 
-<file path=ppt/slideLayouts/slideLayout31.xml><?xml version="1.0" encoding="utf-8"?>
+<file path=ppt/slideLayouts/slideLayout3.xml><?xml version="1.0" encoding="utf-8"?>
+<p:sldLayout xmlns:a="http://schemas.openxmlformats.org/drawingml/2006/main" xmlns:r="http://schemas.openxmlformats.org/officeDocument/2006/relationships" xmlns:p="http://schemas.openxmlformats.org/presentationml/2006/main" preserve="1">
+  <p:cSld name="3_Demo, Video etc. &quot;special&quot; slides">
+    <p:bg>
+      <p:bgPr>
+        <a:blipFill dpi="0" rotWithShape="1">
+          <a:blip r:embed="rId2">
+            <a:lum/>
+            <a:extLst>
+              <a:ext uri="{28A0092B-C50C-407E-A947-70E740481C1C}">
+                <a14:useLocalDpi xmlns:a14="http://schemas.microsoft.com/office/drawing/2010/main"/>
+              </a:ext>
+            </a:extLst>
+          </a:blip>
+          <a:srcRect/>
+          <a:stretch>
+            <a:fillRect/>
+          </a:stretch>
+        </a:blipFill>
+        <a:effectLst/>
+      </p:bgPr>
+    </p:bg>
+    <p:spTree>
+      <p:nvGrpSpPr>
+        <p:cNvPr id="1" name=""/>
+        <p:cNvGrpSpPr/>
+        <p:nvPr/>
+      </p:nvGrpSpPr>
+      <p:grpSpPr>
+        <a:xfrm>
+          <a:off x="0" y="0"/>
+          <a:ext cx="0" cy="0"/>
+          <a:chOff x="0" y="0"/>
+          <a:chExt cx="0" cy="0"/>
+        </a:xfrm>
+      </p:grpSpPr>
+      <p:sp>
+        <p:nvSpPr>
+          <p:cNvPr id="2" name="Title 1"/>
+          <p:cNvSpPr>
+            <a:spLocks noGrp="1"/>
+          </p:cNvSpPr>
+          <p:nvPr>
+            <p:ph type="ctrTitle"/>
+          </p:nvPr>
+        </p:nvSpPr>
+        <p:spPr>
+          <a:xfrm>
+            <a:off x="627623" y="2455047"/>
+            <a:ext cx="6994362" cy="1523494"/>
+          </a:xfrm>
+        </p:spPr>
+        <p:txBody>
+          <a:bodyPr anchor="ctr" anchorCtr="0">
+            <a:noAutofit/>
+          </a:bodyPr>
+          <a:lstStyle>
+            <a:lvl1pPr>
+              <a:lnSpc>
+                <a:spcPct val="90000"/>
+              </a:lnSpc>
+              <a:defRPr sz="4800"/>
+            </a:lvl1pPr>
+          </a:lstStyle>
+          <a:p>
+            <a:r>
+              <a:rPr lang="en-US" smtClean="0"/>
+              <a:t>Click to edit Master title style</a:t>
+            </a:r>
+            <a:endParaRPr lang="en-US" dirty="0"/>
+          </a:p>
+        </p:txBody>
+      </p:sp>
+      <p:sp>
+        <p:nvSpPr>
+          <p:cNvPr id="3" name="Subtitle 2"/>
+          <p:cNvSpPr>
+            <a:spLocks noGrp="1"/>
+          </p:cNvSpPr>
+          <p:nvPr>
+            <p:ph type="subTitle" idx="1"/>
+          </p:nvPr>
+        </p:nvSpPr>
+        <p:spPr>
+          <a:xfrm>
+            <a:off x="627624" y="4189146"/>
+            <a:ext cx="6994363" cy="461665"/>
+          </a:xfrm>
+        </p:spPr>
+        <p:txBody>
+          <a:bodyPr>
+            <a:noAutofit/>
+          </a:bodyPr>
+          <a:lstStyle>
+            <a:lvl1pPr marL="0" indent="0" algn="l">
+              <a:lnSpc>
+                <a:spcPct val="90000"/>
+              </a:lnSpc>
+              <a:spcBef>
+                <a:spcPts val="0"/>
+              </a:spcBef>
+              <a:buNone/>
+              <a:defRPr>
+                <a:gradFill>
+                  <a:gsLst>
+                    <a:gs pos="0">
+                      <a:schemeClr val="tx1"/>
+                    </a:gs>
+                    <a:gs pos="86000">
+                      <a:schemeClr val="tx1"/>
+                    </a:gs>
+                  </a:gsLst>
+                  <a:lin ang="5400000" scaled="0"/>
+                </a:gradFill>
+              </a:defRPr>
+            </a:lvl1pPr>
+            <a:lvl2pPr marL="457182" indent="0" algn="ctr">
+              <a:buNone/>
+              <a:defRPr>
+                <a:solidFill>
+                  <a:schemeClr val="tx1">
+                    <a:tint val="75000"/>
+                  </a:schemeClr>
+                </a:solidFill>
+              </a:defRPr>
+            </a:lvl2pPr>
+            <a:lvl3pPr marL="914363" indent="0" algn="ctr">
+              <a:buNone/>
+              <a:defRPr>
+                <a:solidFill>
+                  <a:schemeClr val="tx1">
+                    <a:tint val="75000"/>
+                  </a:schemeClr>
+                </a:solidFill>
+              </a:defRPr>
+            </a:lvl3pPr>
+            <a:lvl4pPr marL="1371545" indent="0" algn="ctr">
+              <a:buNone/>
+              <a:defRPr>
+                <a:solidFill>
+                  <a:schemeClr val="tx1">
+                    <a:tint val="75000"/>
+                  </a:schemeClr>
+                </a:solidFill>
+              </a:defRPr>
+            </a:lvl4pPr>
+            <a:lvl5pPr marL="1828727" indent="0" algn="ctr">
+              <a:buNone/>
+              <a:defRPr>
+                <a:solidFill>
+                  <a:schemeClr val="tx1">
+                    <a:tint val="75000"/>
+                  </a:schemeClr>
+                </a:solidFill>
+              </a:defRPr>
+            </a:lvl5pPr>
+            <a:lvl6pPr marL="2285909" indent="0" algn="ctr">
+              <a:buNone/>
+              <a:defRPr>
+                <a:solidFill>
+                  <a:schemeClr val="tx1">
+                    <a:tint val="75000"/>
+                  </a:schemeClr>
+                </a:solidFill>
+              </a:defRPr>
+            </a:lvl6pPr>
+            <a:lvl7pPr marL="2743090" indent="0" algn="ctr">
+              <a:buNone/>
+              <a:defRPr>
+                <a:solidFill>
+                  <a:schemeClr val="tx1">
+                    <a:tint val="75000"/>
+                  </a:schemeClr>
+                </a:solidFill>
+              </a:defRPr>
+            </a:lvl7pPr>
+            <a:lvl8pPr marL="3200272" indent="0" algn="ctr">
+              <a:buNone/>
+              <a:defRPr>
+                <a:solidFill>
+                  <a:schemeClr val="tx1">
+                    <a:tint val="75000"/>
+                  </a:schemeClr>
+                </a:solidFill>
+              </a:defRPr>
+            </a:lvl8pPr>
+            <a:lvl9pPr marL="3657454" indent="0" algn="ctr">
+              <a:buNone/>
+              <a:defRPr>
+                <a:solidFill>
+                  <a:schemeClr val="tx1">
+                    <a:tint val="75000"/>
+                  </a:schemeClr>
+                </a:solidFill>
+              </a:defRPr>
+            </a:lvl9pPr>
+          </a:lstStyle>
+          <a:p>
+            <a:r>
+              <a:rPr lang="en-US" smtClean="0"/>
+              <a:t>Click to edit Master subtitle style</a:t>
+            </a:r>
+            <a:endParaRPr lang="en-US" dirty="0"/>
+          </a:p>
+        </p:txBody>
+      </p:sp>
+      <p:sp>
+        <p:nvSpPr>
+          <p:cNvPr id="4" name="Text Placeholder 6"/>
+          <p:cNvSpPr>
+            <a:spLocks noGrp="1"/>
+          </p:cNvSpPr>
+          <p:nvPr>
+            <p:ph type="body" sz="quarter" idx="10" hasCustomPrompt="1"/>
+          </p:nvPr>
+        </p:nvSpPr>
+        <p:spPr>
+          <a:xfrm>
+            <a:off x="799118" y="4876800"/>
+            <a:ext cx="7683914" cy="1378644"/>
+          </a:xfrm>
+        </p:spPr>
+        <p:txBody>
+          <a:bodyPr anchor="t" anchorCtr="0">
+            <a:noAutofit/>
+            <a:scene3d>
+              <a:camera prst="orthographicFront"/>
+              <a:lightRig rig="flat" dir="t"/>
+            </a:scene3d>
+            <a:sp3d>
+              <a:contourClr>
+                <a:schemeClr val="tx2"/>
+              </a:contourClr>
+            </a:sp3d>
+          </a:bodyPr>
+          <a:lstStyle>
+            <a:lvl1pPr marL="0" indent="0" algn="r">
+              <a:buFont typeface="Arial" pitchFamily="34" charset="0"/>
+              <a:buNone/>
+              <a:defRPr kumimoji="0" lang="en-US" sz="10000" b="0" i="1" u="none" strike="noStrike" kern="1200" cap="none" spc="-642" normalizeH="0" baseline="0" noProof="0" dirty="0" smtClean="0">
+                <a:ln w="11430"/>
+                <a:solidFill>
+                  <a:schemeClr val="accent1">
+                    <a:alpha val="99000"/>
+                  </a:schemeClr>
+                </a:solidFill>
+                <a:effectLst/>
+                <a:uLnTx/>
+                <a:uFillTx/>
+                <a:latin typeface="+mj-lt"/>
+                <a:ea typeface="+mn-ea"/>
+                <a:cs typeface="+mn-cs"/>
+              </a:defRPr>
+            </a:lvl1pPr>
+          </a:lstStyle>
+          <a:p>
+            <a:pPr lvl="0"/>
+            <a:r>
+              <a:rPr lang="en-US" dirty="0" smtClean="0"/>
+              <a:t>click to…</a:t>
+            </a:r>
+          </a:p>
+        </p:txBody>
+      </p:sp>
+    </p:spTree>
+    <p:extLst>
+      <p:ext uri="{BB962C8B-B14F-4D97-AF65-F5344CB8AC3E}">
+        <p14:creationId xmlns:p14="http://schemas.microsoft.com/office/powerpoint/2010/main" val="4159477088"/>
+      </p:ext>
+    </p:extLst>
+  </p:cSld>
+  <p:clrMapOvr>
+    <a:masterClrMapping/>
+  </p:clrMapOvr>
+  <p:transition>
+    <p:fade/>
+  </p:transition>
+</p:sldLayout>
+</file>
+
+<file path=ppt/slideLayouts/slideLayout30.xml><?xml version="1.0" encoding="utf-8"?>
 <p:sldLayout xmlns:a="http://schemas.openxmlformats.org/drawingml/2006/main" xmlns:r="http://schemas.openxmlformats.org/officeDocument/2006/relationships" xmlns:p="http://schemas.openxmlformats.org/presentationml/2006/main" type="obj" preserve="1">
   <p:cSld name="Title and Content">
     <p:spTree>
@@ -5883,13 +5891,13 @@
   <p:clrMapOvr>
     <a:masterClrMapping/>
   </p:clrMapOvr>
-  <p:transition xmlns:p14="http://schemas.microsoft.com/office/powerpoint/2010/main">
+  <p:transition>
     <p:fade/>
   </p:transition>
 </p:sldLayout>
 </file>
 
-<file path=ppt/slideLayouts/slideLayout32.xml><?xml version="1.0" encoding="utf-8"?>
+<file path=ppt/slideLayouts/slideLayout31.xml><?xml version="1.0" encoding="utf-8"?>
 <p:sldLayout xmlns:a="http://schemas.openxmlformats.org/drawingml/2006/main" xmlns:r="http://schemas.openxmlformats.org/officeDocument/2006/relationships" xmlns:p="http://schemas.openxmlformats.org/presentationml/2006/main" type="twoObj" preserve="1">
   <p:cSld name="Two Content">
     <p:spTree>
@@ -6183,20 +6191,20 @@
   <p:clrMapOvr>
     <a:masterClrMapping/>
   </p:clrMapOvr>
-  <p:transition xmlns:p14="http://schemas.microsoft.com/office/powerpoint/2010/main">
+  <p:transition>
     <p:fade/>
   </p:transition>
   <p:timing>
     <p:tnLst>
       <p:par>
-        <p:cTn xmlns:p14="http://schemas.microsoft.com/office/powerpoint/2010/main" id="1" dur="indefinite" restart="never" nodeType="tmRoot"/>
+        <p:cTn id="1" dur="indefinite" restart="never" nodeType="tmRoot"/>
       </p:par>
     </p:tnLst>
   </p:timing>
 </p:sldLayout>
 </file>
 
-<file path=ppt/slideLayouts/slideLayout33.xml><?xml version="1.0" encoding="utf-8"?>
+<file path=ppt/slideLayouts/slideLayout32.xml><?xml version="1.0" encoding="utf-8"?>
 <p:sldLayout xmlns:a="http://schemas.openxmlformats.org/drawingml/2006/main" xmlns:r="http://schemas.openxmlformats.org/officeDocument/2006/relationships" xmlns:p="http://schemas.openxmlformats.org/presentationml/2006/main" type="twoTxTwoObj" preserve="1">
   <p:cSld name="Comparison">
     <p:spTree>
@@ -6602,13 +6610,13 @@
   <p:clrMapOvr>
     <a:masterClrMapping/>
   </p:clrMapOvr>
-  <p:transition xmlns:p14="http://schemas.microsoft.com/office/powerpoint/2010/main">
+  <p:transition>
     <p:fade/>
   </p:transition>
 </p:sldLayout>
 </file>
 
-<file path=ppt/slideLayouts/slideLayout34.xml><?xml version="1.0" encoding="utf-8"?>
+<file path=ppt/slideLayouts/slideLayout33.xml><?xml version="1.0" encoding="utf-8"?>
 <p:sldLayout xmlns:a="http://schemas.openxmlformats.org/drawingml/2006/main" xmlns:r="http://schemas.openxmlformats.org/officeDocument/2006/relationships" xmlns:p="http://schemas.openxmlformats.org/presentationml/2006/main" type="titleOnly" preserve="1">
   <p:cSld name="Title Only">
     <p:spTree>
@@ -6662,20 +6670,20 @@
   <p:clrMapOvr>
     <a:masterClrMapping/>
   </p:clrMapOvr>
-  <p:transition xmlns:p14="http://schemas.microsoft.com/office/powerpoint/2010/main">
+  <p:transition>
     <p:fade/>
   </p:transition>
   <p:timing>
     <p:tnLst>
       <p:par>
-        <p:cTn xmlns:p14="http://schemas.microsoft.com/office/powerpoint/2010/main" id="1" dur="indefinite" restart="never" nodeType="tmRoot"/>
+        <p:cTn id="1" dur="indefinite" restart="never" nodeType="tmRoot"/>
       </p:par>
     </p:tnLst>
   </p:timing>
 </p:sldLayout>
 </file>
 
-<file path=ppt/slideLayouts/slideLayout35.xml><?xml version="1.0" encoding="utf-8"?>
+<file path=ppt/slideLayouts/slideLayout34.xml><?xml version="1.0" encoding="utf-8"?>
 <p:sldLayout xmlns:a="http://schemas.openxmlformats.org/drawingml/2006/main" xmlns:r="http://schemas.openxmlformats.org/officeDocument/2006/relationships" xmlns:p="http://schemas.openxmlformats.org/presentationml/2006/main" type="blank" preserve="1">
   <p:cSld name="Blank">
     <p:spTree>
@@ -6702,70 +6710,16 @@
   <p:clrMapOvr>
     <a:masterClrMapping/>
   </p:clrMapOvr>
-  <p:transition xmlns:p14="http://schemas.microsoft.com/office/powerpoint/2010/main">
+  <p:transition>
     <p:fade/>
   </p:transition>
 </p:sldLayout>
 </file>
 
-<file path=ppt/slideLayouts/slideLayout36.xml><?xml version="1.0" encoding="utf-8"?>
+<file path=ppt/slideLayouts/slideLayout35.xml><?xml version="1.0" encoding="utf-8"?>
 <p:sldLayout xmlns:a="http://schemas.openxmlformats.org/drawingml/2006/main" xmlns:r="http://schemas.openxmlformats.org/officeDocument/2006/relationships" xmlns:p="http://schemas.openxmlformats.org/presentationml/2006/main" type="blank" preserve="1">
   <p:cSld name="1_Blank">
     <p:bg>
-      <p:bgPr>
-        <a:blipFill dpi="0" rotWithShape="1">
-          <a:blip r:embed="rId2">
-            <a:lum/>
-          </a:blip>
-          <a:srcRect/>
-          <a:stretch>
-            <a:fillRect/>
-          </a:stretch>
-        </a:blipFill>
-        <a:effectLst/>
-      </p:bgPr>
-    </p:bg>
-    <p:spTree>
-      <p:nvGrpSpPr>
-        <p:cNvPr id="1" name=""/>
-        <p:cNvGrpSpPr/>
-        <p:nvPr/>
-      </p:nvGrpSpPr>
-      <p:grpSpPr>
-        <a:xfrm>
-          <a:off x="0" y="0"/>
-          <a:ext cx="0" cy="0"/>
-          <a:chOff x="0" y="0"/>
-          <a:chExt cx="0" cy="0"/>
-        </a:xfrm>
-      </p:grpSpPr>
-    </p:spTree>
-    <p:extLst>
-      <p:ext uri="{BB962C8B-B14F-4D97-AF65-F5344CB8AC3E}">
-        <p14:creationId xmlns:p14="http://schemas.microsoft.com/office/powerpoint/2010/main" val="602585429"/>
-      </p:ext>
-    </p:extLst>
-  </p:cSld>
-  <p:clrMapOvr>
-    <a:masterClrMapping/>
-  </p:clrMapOvr>
-  <p:transition xmlns:p14="http://schemas.microsoft.com/office/powerpoint/2010/main">
-    <p:fade/>
-  </p:transition>
-  <p:timing>
-    <p:tnLst>
-      <p:par>
-        <p:cTn xmlns:p14="http://schemas.microsoft.com/office/powerpoint/2010/main" id="1" dur="indefinite" restart="never" nodeType="tmRoot"/>
-      </p:par>
-    </p:tnLst>
-  </p:timing>
-</p:sldLayout>
-</file>
-
-<file path=ppt/slideLayouts/slideLayout37.xml><?xml version="1.0" encoding="utf-8"?>
-<p:sldLayout xmlns:a="http://schemas.openxmlformats.org/drawingml/2006/main" xmlns:r="http://schemas.openxmlformats.org/officeDocument/2006/relationships" xmlns:p="http://schemas.openxmlformats.org/presentationml/2006/main" type="blank" preserve="1">
-  <p:cSld name="1_WALKIN - Prints in GRAYSCALE">
-    <p:bg bwMode="ltGray">
       <p:bgPr>
         <a:blipFill dpi="0" rotWithShape="1">
           <a:blip r:embed="rId2">
@@ -6801,27 +6755,27 @@
     </p:spTree>
     <p:extLst>
       <p:ext uri="{BB962C8B-B14F-4D97-AF65-F5344CB8AC3E}">
-        <p14:creationId xmlns:p14="http://schemas.microsoft.com/office/powerpoint/2010/main" val="1296239216"/>
+        <p14:creationId xmlns:p14="http://schemas.microsoft.com/office/powerpoint/2010/main" val="602585429"/>
       </p:ext>
     </p:extLst>
   </p:cSld>
   <p:clrMapOvr>
     <a:masterClrMapping/>
   </p:clrMapOvr>
-  <p:transition xmlns:p14="http://schemas.microsoft.com/office/powerpoint/2010/main">
+  <p:transition>
     <p:fade/>
   </p:transition>
   <p:timing>
     <p:tnLst>
       <p:par>
-        <p:cTn xmlns:p14="http://schemas.microsoft.com/office/powerpoint/2010/main" id="1" dur="indefinite" restart="never" nodeType="tmRoot"/>
+        <p:cTn id="1" dur="indefinite" restart="never" nodeType="tmRoot"/>
       </p:par>
     </p:tnLst>
   </p:timing>
 </p:sldLayout>
 </file>
 
-<file path=ppt/slideLayouts/slideLayout38.xml><?xml version="1.0" encoding="utf-8"?>
+<file path=ppt/slideLayouts/slideLayout36.xml><?xml version="1.0" encoding="utf-8"?>
 <p:sldLayout xmlns:a="http://schemas.openxmlformats.org/drawingml/2006/main" xmlns:r="http://schemas.openxmlformats.org/officeDocument/2006/relationships" xmlns:p="http://schemas.openxmlformats.org/presentationml/2006/main" preserve="1">
   <p:cSld name="Black Layout - Title and Content">
     <p:bg bwMode="black">
@@ -7059,13 +7013,13 @@
   <p:clrMapOvr>
     <a:masterClrMapping/>
   </p:clrMapOvr>
-  <p:transition xmlns:p14="http://schemas.microsoft.com/office/powerpoint/2010/main">
+  <p:transition>
     <p:fade/>
   </p:transition>
 </p:sldLayout>
 </file>
 
-<file path=ppt/slideLayouts/slideLayout39.xml><?xml version="1.0" encoding="utf-8"?>
+<file path=ppt/slideLayouts/slideLayout37.xml><?xml version="1.0" encoding="utf-8"?>
 <p:sldLayout xmlns:a="http://schemas.openxmlformats.org/drawingml/2006/main" xmlns:r="http://schemas.openxmlformats.org/officeDocument/2006/relationships" xmlns:p="http://schemas.openxmlformats.org/presentationml/2006/main" preserve="1">
   <p:cSld name="Black Notes slide Layout">
     <p:bg bwMode="black">
@@ -7355,288 +7309,13 @@
   <p:clrMapOvr>
     <a:masterClrMapping/>
   </p:clrMapOvr>
-  <p:transition xmlns:p14="http://schemas.microsoft.com/office/powerpoint/2010/main">
+  <p:transition>
     <p:fade/>
   </p:transition>
 </p:sldLayout>
 </file>
 
-<file path=ppt/slideLayouts/slideLayout4.xml><?xml version="1.0" encoding="utf-8"?>
-<p:sldLayout xmlns:a="http://schemas.openxmlformats.org/drawingml/2006/main" xmlns:r="http://schemas.openxmlformats.org/officeDocument/2006/relationships" xmlns:p="http://schemas.openxmlformats.org/presentationml/2006/main" preserve="1">
-  <p:cSld name="2_Demo, Video etc. &quot;special&quot; slides">
-    <p:bg>
-      <p:bgPr>
-        <a:blipFill dpi="0" rotWithShape="1">
-          <a:blip r:embed="rId2">
-            <a:lum/>
-          </a:blip>
-          <a:srcRect/>
-          <a:stretch>
-            <a:fillRect/>
-          </a:stretch>
-        </a:blipFill>
-        <a:effectLst/>
-      </p:bgPr>
-    </p:bg>
-    <p:spTree>
-      <p:nvGrpSpPr>
-        <p:cNvPr id="1" name=""/>
-        <p:cNvGrpSpPr/>
-        <p:nvPr/>
-      </p:nvGrpSpPr>
-      <p:grpSpPr>
-        <a:xfrm>
-          <a:off x="0" y="0"/>
-          <a:ext cx="0" cy="0"/>
-          <a:chOff x="0" y="0"/>
-          <a:chExt cx="0" cy="0"/>
-        </a:xfrm>
-      </p:grpSpPr>
-      <p:sp>
-        <p:nvSpPr>
-          <p:cNvPr id="2" name="Title 1"/>
-          <p:cNvSpPr>
-            <a:spLocks noGrp="1"/>
-          </p:cNvSpPr>
-          <p:nvPr>
-            <p:ph type="ctrTitle"/>
-          </p:nvPr>
-        </p:nvSpPr>
-        <p:spPr>
-          <a:xfrm>
-            <a:off x="627623" y="2442175"/>
-            <a:ext cx="6994362" cy="1523494"/>
-          </a:xfrm>
-        </p:spPr>
-        <p:txBody>
-          <a:bodyPr anchor="ctr" anchorCtr="0">
-            <a:noAutofit/>
-          </a:bodyPr>
-          <a:lstStyle>
-            <a:lvl1pPr>
-              <a:lnSpc>
-                <a:spcPct val="90000"/>
-              </a:lnSpc>
-              <a:defRPr sz="4800"/>
-            </a:lvl1pPr>
-          </a:lstStyle>
-          <a:p>
-            <a:r>
-              <a:rPr lang="en-US" smtClean="0"/>
-              <a:t>Click to edit Master title style</a:t>
-            </a:r>
-            <a:endParaRPr lang="en-US" dirty="0"/>
-          </a:p>
-        </p:txBody>
-      </p:sp>
-      <p:sp>
-        <p:nvSpPr>
-          <p:cNvPr id="3" name="Subtitle 2"/>
-          <p:cNvSpPr>
-            <a:spLocks noGrp="1"/>
-          </p:cNvSpPr>
-          <p:nvPr>
-            <p:ph type="subTitle" idx="1"/>
-          </p:nvPr>
-        </p:nvSpPr>
-        <p:spPr>
-          <a:xfrm>
-            <a:off x="627624" y="4191003"/>
-            <a:ext cx="6994363" cy="461665"/>
-          </a:xfrm>
-        </p:spPr>
-        <p:txBody>
-          <a:bodyPr>
-            <a:noAutofit/>
-          </a:bodyPr>
-          <a:lstStyle>
-            <a:lvl1pPr marL="0" indent="0" algn="l">
-              <a:lnSpc>
-                <a:spcPct val="90000"/>
-              </a:lnSpc>
-              <a:spcBef>
-                <a:spcPts val="0"/>
-              </a:spcBef>
-              <a:buNone/>
-              <a:defRPr>
-                <a:gradFill>
-                  <a:gsLst>
-                    <a:gs pos="0">
-                      <a:schemeClr val="tx1"/>
-                    </a:gs>
-                    <a:gs pos="86000">
-                      <a:schemeClr val="tx1"/>
-                    </a:gs>
-                  </a:gsLst>
-                  <a:lin ang="5400000" scaled="0"/>
-                </a:gradFill>
-              </a:defRPr>
-            </a:lvl1pPr>
-            <a:lvl2pPr marL="457182" indent="0" algn="ctr">
-              <a:buNone/>
-              <a:defRPr>
-                <a:solidFill>
-                  <a:schemeClr val="tx1">
-                    <a:tint val="75000"/>
-                  </a:schemeClr>
-                </a:solidFill>
-              </a:defRPr>
-            </a:lvl2pPr>
-            <a:lvl3pPr marL="914363" indent="0" algn="ctr">
-              <a:buNone/>
-              <a:defRPr>
-                <a:solidFill>
-                  <a:schemeClr val="tx1">
-                    <a:tint val="75000"/>
-                  </a:schemeClr>
-                </a:solidFill>
-              </a:defRPr>
-            </a:lvl3pPr>
-            <a:lvl4pPr marL="1371545" indent="0" algn="ctr">
-              <a:buNone/>
-              <a:defRPr>
-                <a:solidFill>
-                  <a:schemeClr val="tx1">
-                    <a:tint val="75000"/>
-                  </a:schemeClr>
-                </a:solidFill>
-              </a:defRPr>
-            </a:lvl4pPr>
-            <a:lvl5pPr marL="1828727" indent="0" algn="ctr">
-              <a:buNone/>
-              <a:defRPr>
-                <a:solidFill>
-                  <a:schemeClr val="tx1">
-                    <a:tint val="75000"/>
-                  </a:schemeClr>
-                </a:solidFill>
-              </a:defRPr>
-            </a:lvl5pPr>
-            <a:lvl6pPr marL="2285909" indent="0" algn="ctr">
-              <a:buNone/>
-              <a:defRPr>
-                <a:solidFill>
-                  <a:schemeClr val="tx1">
-                    <a:tint val="75000"/>
-                  </a:schemeClr>
-                </a:solidFill>
-              </a:defRPr>
-            </a:lvl6pPr>
-            <a:lvl7pPr marL="2743090" indent="0" algn="ctr">
-              <a:buNone/>
-              <a:defRPr>
-                <a:solidFill>
-                  <a:schemeClr val="tx1">
-                    <a:tint val="75000"/>
-                  </a:schemeClr>
-                </a:solidFill>
-              </a:defRPr>
-            </a:lvl7pPr>
-            <a:lvl8pPr marL="3200272" indent="0" algn="ctr">
-              <a:buNone/>
-              <a:defRPr>
-                <a:solidFill>
-                  <a:schemeClr val="tx1">
-                    <a:tint val="75000"/>
-                  </a:schemeClr>
-                </a:solidFill>
-              </a:defRPr>
-            </a:lvl8pPr>
-            <a:lvl9pPr marL="3657454" indent="0" algn="ctr">
-              <a:buNone/>
-              <a:defRPr>
-                <a:solidFill>
-                  <a:schemeClr val="tx1">
-                    <a:tint val="75000"/>
-                  </a:schemeClr>
-                </a:solidFill>
-              </a:defRPr>
-            </a:lvl9pPr>
-          </a:lstStyle>
-          <a:p>
-            <a:r>
-              <a:rPr lang="en-US" smtClean="0"/>
-              <a:t>Click to edit Master subtitle style</a:t>
-            </a:r>
-            <a:endParaRPr lang="en-US" dirty="0"/>
-          </a:p>
-        </p:txBody>
-      </p:sp>
-      <p:sp>
-        <p:nvSpPr>
-          <p:cNvPr id="5" name="Text Placeholder 6"/>
-          <p:cNvSpPr>
-            <a:spLocks noGrp="1"/>
-          </p:cNvSpPr>
-          <p:nvPr>
-            <p:ph type="body" sz="quarter" idx="10" hasCustomPrompt="1"/>
-          </p:nvPr>
-        </p:nvSpPr>
-        <p:spPr>
-          <a:xfrm>
-            <a:off x="799118" y="4876800"/>
-            <a:ext cx="7683914" cy="1378644"/>
-          </a:xfrm>
-        </p:spPr>
-        <p:txBody>
-          <a:bodyPr anchor="t" anchorCtr="0">
-            <a:noAutofit/>
-            <a:scene3d>
-              <a:camera prst="orthographicFront"/>
-              <a:lightRig rig="flat" dir="t"/>
-            </a:scene3d>
-            <a:sp3d>
-              <a:contourClr>
-                <a:schemeClr val="tx2"/>
-              </a:contourClr>
-            </a:sp3d>
-          </a:bodyPr>
-          <a:lstStyle>
-            <a:lvl1pPr marL="0" indent="0" algn="r">
-              <a:buFont typeface="Arial" pitchFamily="34" charset="0"/>
-              <a:buNone/>
-              <a:defRPr kumimoji="0" lang="en-US" sz="10000" b="0" i="1" u="none" strike="noStrike" kern="1200" cap="none" spc="-642" normalizeH="0" baseline="0" noProof="0" dirty="0" smtClean="0">
-                <a:ln w="11430"/>
-                <a:solidFill>
-                  <a:schemeClr val="accent1">
-                    <a:alpha val="99000"/>
-                  </a:schemeClr>
-                </a:solidFill>
-                <a:effectLst/>
-                <a:uLnTx/>
-                <a:uFillTx/>
-                <a:latin typeface="+mj-lt"/>
-                <a:ea typeface="+mn-ea"/>
-                <a:cs typeface="+mn-cs"/>
-              </a:defRPr>
-            </a:lvl1pPr>
-          </a:lstStyle>
-          <a:p>
-            <a:pPr lvl="0"/>
-            <a:r>
-              <a:rPr lang="en-US" dirty="0" smtClean="0"/>
-              <a:t>click to…</a:t>
-            </a:r>
-          </a:p>
-        </p:txBody>
-      </p:sp>
-    </p:spTree>
-    <p:extLst>
-      <p:ext uri="{BB962C8B-B14F-4D97-AF65-F5344CB8AC3E}">
-        <p14:creationId xmlns:p14="http://schemas.microsoft.com/office/powerpoint/2010/main" val="1328755194"/>
-      </p:ext>
-    </p:extLst>
-  </p:cSld>
-  <p:clrMapOvr>
-    <a:masterClrMapping/>
-  </p:clrMapOvr>
-  <p:transition xmlns:p14="http://schemas.microsoft.com/office/powerpoint/2010/main">
-    <p:fade/>
-  </p:transition>
-</p:sldLayout>
-</file>
-
-<file path=ppt/slideLayouts/slideLayout40.xml><?xml version="1.0" encoding="utf-8"?>
+<file path=ppt/slideLayouts/slideLayout38.xml><?xml version="1.0" encoding="utf-8"?>
 <p:sldLayout xmlns:a="http://schemas.openxmlformats.org/drawingml/2006/main" xmlns:r="http://schemas.openxmlformats.org/officeDocument/2006/relationships" xmlns:p="http://schemas.openxmlformats.org/presentationml/2006/main">
   <p:cSld name="Use for slides with Software Code">
     <p:bg>
@@ -7798,20 +7477,20 @@
   <p:clrMapOvr>
     <a:masterClrMapping/>
   </p:clrMapOvr>
-  <p:transition xmlns:p14="http://schemas.microsoft.com/office/powerpoint/2010/main">
+  <p:transition>
     <p:fade/>
   </p:transition>
   <p:timing>
     <p:tnLst>
       <p:par>
-        <p:cTn xmlns:p14="http://schemas.microsoft.com/office/powerpoint/2010/main" id="1" dur="indefinite" restart="never" nodeType="tmRoot"/>
+        <p:cTn id="1" dur="indefinite" restart="never" nodeType="tmRoot"/>
       </p:par>
     </p:tnLst>
   </p:timing>
 </p:sldLayout>
 </file>
 
-<file path=ppt/slideLayouts/slideLayout41.xml><?xml version="1.0" encoding="utf-8"?>
+<file path=ppt/slideLayouts/slideLayout39.xml><?xml version="1.0" encoding="utf-8"?>
 <p:sldLayout xmlns:a="http://schemas.openxmlformats.org/drawingml/2006/main" xmlns:r="http://schemas.openxmlformats.org/officeDocument/2006/relationships" xmlns:p="http://schemas.openxmlformats.org/presentationml/2006/main" preserve="1">
   <p:cSld name="Use for slides with Software Code">
     <p:bg>
@@ -7978,27 +7657,32 @@
   <p:clrMapOvr>
     <a:masterClrMapping/>
   </p:clrMapOvr>
-  <p:transition xmlns:p14="http://schemas.microsoft.com/office/powerpoint/2010/main">
+  <p:transition>
     <p:fade/>
   </p:transition>
   <p:timing>
     <p:tnLst>
       <p:par>
-        <p:cTn xmlns:p14="http://schemas.microsoft.com/office/powerpoint/2010/main" id="1" dur="indefinite" restart="never" nodeType="tmRoot"/>
+        <p:cTn id="1" dur="indefinite" restart="never" nodeType="tmRoot"/>
       </p:par>
     </p:tnLst>
   </p:timing>
 </p:sldLayout>
 </file>
 
-<file path=ppt/slideLayouts/slideLayout5.xml><?xml version="1.0" encoding="utf-8"?>
+<file path=ppt/slideLayouts/slideLayout4.xml><?xml version="1.0" encoding="utf-8"?>
 <p:sldLayout xmlns:a="http://schemas.openxmlformats.org/drawingml/2006/main" xmlns:r="http://schemas.openxmlformats.org/officeDocument/2006/relationships" xmlns:p="http://schemas.openxmlformats.org/presentationml/2006/main" preserve="1">
-  <p:cSld name="4_Demo, Video etc. &quot;special&quot; slides">
+  <p:cSld name="2_Demo, Video etc. &quot;special&quot; slides">
     <p:bg>
       <p:bgPr>
         <a:blipFill dpi="0" rotWithShape="1">
           <a:blip r:embed="rId2">
             <a:lum/>
+            <a:extLst>
+              <a:ext uri="{28A0092B-C50C-407E-A947-70E740481C1C}">
+                <a14:useLocalDpi xmlns:a14="http://schemas.microsoft.com/office/drawing/2010/main"/>
+              </a:ext>
+            </a:extLst>
           </a:blip>
           <a:srcRect/>
           <a:stretch>
@@ -8253,27 +7937,32 @@
     </p:spTree>
     <p:extLst>
       <p:ext uri="{BB962C8B-B14F-4D97-AF65-F5344CB8AC3E}">
-        <p14:creationId xmlns:p14="http://schemas.microsoft.com/office/powerpoint/2010/main" val="178639449"/>
+        <p14:creationId xmlns:p14="http://schemas.microsoft.com/office/powerpoint/2010/main" val="1328755194"/>
       </p:ext>
     </p:extLst>
   </p:cSld>
   <p:clrMapOvr>
     <a:masterClrMapping/>
   </p:clrMapOvr>
-  <p:transition xmlns:p14="http://schemas.microsoft.com/office/powerpoint/2010/main">
+  <p:transition>
     <p:fade/>
   </p:transition>
 </p:sldLayout>
 </file>
 
-<file path=ppt/slideLayouts/slideLayout6.xml><?xml version="1.0" encoding="utf-8"?>
+<file path=ppt/slideLayouts/slideLayout5.xml><?xml version="1.0" encoding="utf-8"?>
 <p:sldLayout xmlns:a="http://schemas.openxmlformats.org/drawingml/2006/main" xmlns:r="http://schemas.openxmlformats.org/officeDocument/2006/relationships" xmlns:p="http://schemas.openxmlformats.org/presentationml/2006/main" preserve="1">
-  <p:cSld name="5_Demo, Video etc. &quot;special&quot; slides">
+  <p:cSld name="4_Demo, Video etc. &quot;special&quot; slides">
     <p:bg>
       <p:bgPr>
         <a:blipFill dpi="0" rotWithShape="1">
           <a:blip r:embed="rId2">
             <a:lum/>
+            <a:extLst>
+              <a:ext uri="{28A0092B-C50C-407E-A947-70E740481C1C}">
+                <a14:useLocalDpi xmlns:a14="http://schemas.microsoft.com/office/drawing/2010/main"/>
+              </a:ext>
+            </a:extLst>
           </a:blip>
           <a:srcRect/>
           <a:stretch>
@@ -8528,27 +8217,32 @@
     </p:spTree>
     <p:extLst>
       <p:ext uri="{BB962C8B-B14F-4D97-AF65-F5344CB8AC3E}">
-        <p14:creationId xmlns:p14="http://schemas.microsoft.com/office/powerpoint/2010/main" val="390226560"/>
+        <p14:creationId xmlns:p14="http://schemas.microsoft.com/office/powerpoint/2010/main" val="178639449"/>
       </p:ext>
     </p:extLst>
   </p:cSld>
   <p:clrMapOvr>
     <a:masterClrMapping/>
   </p:clrMapOvr>
-  <p:transition xmlns:p14="http://schemas.microsoft.com/office/powerpoint/2010/main">
+  <p:transition>
     <p:fade/>
   </p:transition>
 </p:sldLayout>
 </file>
 
-<file path=ppt/slideLayouts/slideLayout7.xml><?xml version="1.0" encoding="utf-8"?>
+<file path=ppt/slideLayouts/slideLayout6.xml><?xml version="1.0" encoding="utf-8"?>
 <p:sldLayout xmlns:a="http://schemas.openxmlformats.org/drawingml/2006/main" xmlns:r="http://schemas.openxmlformats.org/officeDocument/2006/relationships" xmlns:p="http://schemas.openxmlformats.org/presentationml/2006/main" preserve="1">
-  <p:cSld name="6_Demo, Video etc. &quot;special&quot; slides">
+  <p:cSld name="5_Demo, Video etc. &quot;special&quot; slides">
     <p:bg>
       <p:bgPr>
         <a:blipFill dpi="0" rotWithShape="1">
           <a:blip r:embed="rId2">
             <a:lum/>
+            <a:extLst>
+              <a:ext uri="{28A0092B-C50C-407E-A947-70E740481C1C}">
+                <a14:useLocalDpi xmlns:a14="http://schemas.microsoft.com/office/drawing/2010/main"/>
+              </a:ext>
+            </a:extLst>
           </a:blip>
           <a:srcRect/>
           <a:stretch>
@@ -8803,6 +8497,286 @@
     </p:spTree>
     <p:extLst>
       <p:ext uri="{BB962C8B-B14F-4D97-AF65-F5344CB8AC3E}">
+        <p14:creationId xmlns:p14="http://schemas.microsoft.com/office/powerpoint/2010/main" val="390226560"/>
+      </p:ext>
+    </p:extLst>
+  </p:cSld>
+  <p:clrMapOvr>
+    <a:masterClrMapping/>
+  </p:clrMapOvr>
+  <p:transition>
+    <p:fade/>
+  </p:transition>
+</p:sldLayout>
+</file>
+
+<file path=ppt/slideLayouts/slideLayout7.xml><?xml version="1.0" encoding="utf-8"?>
+<p:sldLayout xmlns:a="http://schemas.openxmlformats.org/drawingml/2006/main" xmlns:r="http://schemas.openxmlformats.org/officeDocument/2006/relationships" xmlns:p="http://schemas.openxmlformats.org/presentationml/2006/main" preserve="1">
+  <p:cSld name="6_Demo, Video etc. &quot;special&quot; slides">
+    <p:bg>
+      <p:bgPr>
+        <a:blipFill dpi="0" rotWithShape="1">
+          <a:blip r:embed="rId2">
+            <a:lum/>
+            <a:extLst>
+              <a:ext uri="{28A0092B-C50C-407E-A947-70E740481C1C}">
+                <a14:useLocalDpi xmlns:a14="http://schemas.microsoft.com/office/drawing/2010/main"/>
+              </a:ext>
+            </a:extLst>
+          </a:blip>
+          <a:srcRect/>
+          <a:stretch>
+            <a:fillRect/>
+          </a:stretch>
+        </a:blipFill>
+        <a:effectLst/>
+      </p:bgPr>
+    </p:bg>
+    <p:spTree>
+      <p:nvGrpSpPr>
+        <p:cNvPr id="1" name=""/>
+        <p:cNvGrpSpPr/>
+        <p:nvPr/>
+      </p:nvGrpSpPr>
+      <p:grpSpPr>
+        <a:xfrm>
+          <a:off x="0" y="0"/>
+          <a:ext cx="0" cy="0"/>
+          <a:chOff x="0" y="0"/>
+          <a:chExt cx="0" cy="0"/>
+        </a:xfrm>
+      </p:grpSpPr>
+      <p:sp>
+        <p:nvSpPr>
+          <p:cNvPr id="2" name="Title 1"/>
+          <p:cNvSpPr>
+            <a:spLocks noGrp="1"/>
+          </p:cNvSpPr>
+          <p:nvPr>
+            <p:ph type="ctrTitle"/>
+          </p:nvPr>
+        </p:nvSpPr>
+        <p:spPr>
+          <a:xfrm>
+            <a:off x="627623" y="2442175"/>
+            <a:ext cx="6994362" cy="1523494"/>
+          </a:xfrm>
+        </p:spPr>
+        <p:txBody>
+          <a:bodyPr anchor="ctr" anchorCtr="0">
+            <a:noAutofit/>
+          </a:bodyPr>
+          <a:lstStyle>
+            <a:lvl1pPr>
+              <a:lnSpc>
+                <a:spcPct val="90000"/>
+              </a:lnSpc>
+              <a:defRPr sz="4800"/>
+            </a:lvl1pPr>
+          </a:lstStyle>
+          <a:p>
+            <a:r>
+              <a:rPr lang="en-US" smtClean="0"/>
+              <a:t>Click to edit Master title style</a:t>
+            </a:r>
+            <a:endParaRPr lang="en-US" dirty="0"/>
+          </a:p>
+        </p:txBody>
+      </p:sp>
+      <p:sp>
+        <p:nvSpPr>
+          <p:cNvPr id="3" name="Subtitle 2"/>
+          <p:cNvSpPr>
+            <a:spLocks noGrp="1"/>
+          </p:cNvSpPr>
+          <p:nvPr>
+            <p:ph type="subTitle" idx="1"/>
+          </p:nvPr>
+        </p:nvSpPr>
+        <p:spPr>
+          <a:xfrm>
+            <a:off x="627624" y="4191003"/>
+            <a:ext cx="6994363" cy="461665"/>
+          </a:xfrm>
+        </p:spPr>
+        <p:txBody>
+          <a:bodyPr>
+            <a:noAutofit/>
+          </a:bodyPr>
+          <a:lstStyle>
+            <a:lvl1pPr marL="0" indent="0" algn="l">
+              <a:lnSpc>
+                <a:spcPct val="90000"/>
+              </a:lnSpc>
+              <a:spcBef>
+                <a:spcPts val="0"/>
+              </a:spcBef>
+              <a:buNone/>
+              <a:defRPr>
+                <a:gradFill>
+                  <a:gsLst>
+                    <a:gs pos="0">
+                      <a:schemeClr val="tx1"/>
+                    </a:gs>
+                    <a:gs pos="86000">
+                      <a:schemeClr val="tx1"/>
+                    </a:gs>
+                  </a:gsLst>
+                  <a:lin ang="5400000" scaled="0"/>
+                </a:gradFill>
+              </a:defRPr>
+            </a:lvl1pPr>
+            <a:lvl2pPr marL="457182" indent="0" algn="ctr">
+              <a:buNone/>
+              <a:defRPr>
+                <a:solidFill>
+                  <a:schemeClr val="tx1">
+                    <a:tint val="75000"/>
+                  </a:schemeClr>
+                </a:solidFill>
+              </a:defRPr>
+            </a:lvl2pPr>
+            <a:lvl3pPr marL="914363" indent="0" algn="ctr">
+              <a:buNone/>
+              <a:defRPr>
+                <a:solidFill>
+                  <a:schemeClr val="tx1">
+                    <a:tint val="75000"/>
+                  </a:schemeClr>
+                </a:solidFill>
+              </a:defRPr>
+            </a:lvl3pPr>
+            <a:lvl4pPr marL="1371545" indent="0" algn="ctr">
+              <a:buNone/>
+              <a:defRPr>
+                <a:solidFill>
+                  <a:schemeClr val="tx1">
+                    <a:tint val="75000"/>
+                  </a:schemeClr>
+                </a:solidFill>
+              </a:defRPr>
+            </a:lvl4pPr>
+            <a:lvl5pPr marL="1828727" indent="0" algn="ctr">
+              <a:buNone/>
+              <a:defRPr>
+                <a:solidFill>
+                  <a:schemeClr val="tx1">
+                    <a:tint val="75000"/>
+                  </a:schemeClr>
+                </a:solidFill>
+              </a:defRPr>
+            </a:lvl5pPr>
+            <a:lvl6pPr marL="2285909" indent="0" algn="ctr">
+              <a:buNone/>
+              <a:defRPr>
+                <a:solidFill>
+                  <a:schemeClr val="tx1">
+                    <a:tint val="75000"/>
+                  </a:schemeClr>
+                </a:solidFill>
+              </a:defRPr>
+            </a:lvl6pPr>
+            <a:lvl7pPr marL="2743090" indent="0" algn="ctr">
+              <a:buNone/>
+              <a:defRPr>
+                <a:solidFill>
+                  <a:schemeClr val="tx1">
+                    <a:tint val="75000"/>
+                  </a:schemeClr>
+                </a:solidFill>
+              </a:defRPr>
+            </a:lvl7pPr>
+            <a:lvl8pPr marL="3200272" indent="0" algn="ctr">
+              <a:buNone/>
+              <a:defRPr>
+                <a:solidFill>
+                  <a:schemeClr val="tx1">
+                    <a:tint val="75000"/>
+                  </a:schemeClr>
+                </a:solidFill>
+              </a:defRPr>
+            </a:lvl8pPr>
+            <a:lvl9pPr marL="3657454" indent="0" algn="ctr">
+              <a:buNone/>
+              <a:defRPr>
+                <a:solidFill>
+                  <a:schemeClr val="tx1">
+                    <a:tint val="75000"/>
+                  </a:schemeClr>
+                </a:solidFill>
+              </a:defRPr>
+            </a:lvl9pPr>
+          </a:lstStyle>
+          <a:p>
+            <a:r>
+              <a:rPr lang="en-US" smtClean="0"/>
+              <a:t>Click to edit Master subtitle style</a:t>
+            </a:r>
+            <a:endParaRPr lang="en-US" dirty="0"/>
+          </a:p>
+        </p:txBody>
+      </p:sp>
+      <p:sp>
+        <p:nvSpPr>
+          <p:cNvPr id="5" name="Text Placeholder 6"/>
+          <p:cNvSpPr>
+            <a:spLocks noGrp="1"/>
+          </p:cNvSpPr>
+          <p:nvPr>
+            <p:ph type="body" sz="quarter" idx="10" hasCustomPrompt="1"/>
+          </p:nvPr>
+        </p:nvSpPr>
+        <p:spPr>
+          <a:xfrm>
+            <a:off x="799118" y="4876800"/>
+            <a:ext cx="7683914" cy="1378644"/>
+          </a:xfrm>
+        </p:spPr>
+        <p:txBody>
+          <a:bodyPr anchor="t" anchorCtr="0">
+            <a:noAutofit/>
+            <a:scene3d>
+              <a:camera prst="orthographicFront"/>
+              <a:lightRig rig="flat" dir="t"/>
+            </a:scene3d>
+            <a:sp3d>
+              <a:contourClr>
+                <a:schemeClr val="tx2"/>
+              </a:contourClr>
+            </a:sp3d>
+          </a:bodyPr>
+          <a:lstStyle>
+            <a:lvl1pPr marL="0" indent="0" algn="r">
+              <a:buFont typeface="Arial" pitchFamily="34" charset="0"/>
+              <a:buNone/>
+              <a:defRPr kumimoji="0" lang="en-US" sz="10000" b="0" i="1" u="none" strike="noStrike" kern="1200" cap="none" spc="-642" normalizeH="0" baseline="0" noProof="0" dirty="0" smtClean="0">
+                <a:ln w="11430"/>
+                <a:solidFill>
+                  <a:schemeClr val="accent1">
+                    <a:alpha val="99000"/>
+                  </a:schemeClr>
+                </a:solidFill>
+                <a:effectLst/>
+                <a:uLnTx/>
+                <a:uFillTx/>
+                <a:latin typeface="+mj-lt"/>
+                <a:ea typeface="+mn-ea"/>
+                <a:cs typeface="+mn-cs"/>
+              </a:defRPr>
+            </a:lvl1pPr>
+          </a:lstStyle>
+          <a:p>
+            <a:pPr lvl="0"/>
+            <a:r>
+              <a:rPr lang="en-US" dirty="0" smtClean="0"/>
+              <a:t>click to…</a:t>
+            </a:r>
+          </a:p>
+        </p:txBody>
+      </p:sp>
+    </p:spTree>
+    <p:extLst>
+      <p:ext uri="{BB962C8B-B14F-4D97-AF65-F5344CB8AC3E}">
         <p14:creationId xmlns:p14="http://schemas.microsoft.com/office/powerpoint/2010/main" val="91949658"/>
       </p:ext>
     </p:extLst>
@@ -8810,7 +8784,7 @@
   <p:clrMapOvr>
     <a:masterClrMapping/>
   </p:clrMapOvr>
-  <p:transition xmlns:p14="http://schemas.microsoft.com/office/powerpoint/2010/main">
+  <p:transition>
     <p:fade/>
   </p:transition>
 </p:sldLayout>
@@ -8932,7 +8906,7 @@
   <p:clrMapOvr>
     <a:masterClrMapping/>
   </p:clrMapOvr>
-  <p:transition xmlns:p14="http://schemas.microsoft.com/office/powerpoint/2010/main">
+  <p:transition>
     <p:fade/>
   </p:transition>
 </p:sldLayout>
@@ -9109,7 +9083,7 @@
   <p:clrMapOvr>
     <a:masterClrMapping/>
   </p:clrMapOvr>
-  <p:transition xmlns:p14="http://schemas.microsoft.com/office/powerpoint/2010/main">
+  <p:transition>
     <p:fade/>
   </p:transition>
 </p:sldLayout>
@@ -9121,8 +9095,13 @@
     <p:bg bwMode="blackWhite">
       <p:bgPr>
         <a:blipFill dpi="0" rotWithShape="1">
-          <a:blip r:embed="rId21">
+          <a:blip r:embed="rId20">
             <a:lum/>
+            <a:extLst>
+              <a:ext uri="{28A0092B-C50C-407E-A947-70E740481C1C}">
+                <a14:useLocalDpi xmlns:a14="http://schemas.microsoft.com/office/drawing/2010/main"/>
+              </a:ext>
+            </a:extLst>
           </a:blip>
           <a:srcRect/>
           <a:stretch>
@@ -9265,18 +9244,17 @@
     <p:sldLayoutId id="2147483673" r:id="rId13"/>
     <p:sldLayoutId id="2147483674" r:id="rId14"/>
     <p:sldLayoutId id="2147483675" r:id="rId15"/>
-    <p:sldLayoutId id="2147483676" r:id="rId16"/>
-    <p:sldLayoutId id="2147483677" r:id="rId17"/>
-    <p:sldLayoutId id="2147483678" r:id="rId18"/>
-    <p:sldLayoutId id="2147483679" r:id="rId19"/>
+    <p:sldLayoutId id="2147483677" r:id="rId16"/>
+    <p:sldLayoutId id="2147483678" r:id="rId17"/>
+    <p:sldLayoutId id="2147483679" r:id="rId18"/>
   </p:sldLayoutIdLst>
-  <p:transition xmlns:p14="http://schemas.microsoft.com/office/powerpoint/2010/main">
+  <p:transition>
     <p:fade/>
   </p:transition>
   <p:timing>
     <p:tnLst>
       <p:par>
-        <p:cTn xmlns:p14="http://schemas.microsoft.com/office/powerpoint/2010/main" id="1" dur="indefinite" restart="never" nodeType="tmRoot"/>
+        <p:cTn id="1" dur="indefinite" restart="never" nodeType="tmRoot"/>
       </p:par>
     </p:tnLst>
   </p:timing>
@@ -9324,7 +9302,7 @@
         <a:buSzPct val="90000"/>
         <a:buFontTx/>
         <a:buBlip>
-          <a:blip r:embed="rId22"/>
+          <a:blip r:embed="rId21"/>
         </a:buBlip>
         <a:defRPr sz="3200" kern="1200">
           <a:gradFill>
@@ -9353,7 +9331,7 @@
         <a:buSzPct val="90000"/>
         <a:buFontTx/>
         <a:buBlip>
-          <a:blip r:embed="rId22"/>
+          <a:blip r:embed="rId21"/>
         </a:buBlip>
         <a:defRPr sz="2800" kern="1200">
           <a:gradFill>
@@ -9382,7 +9360,7 @@
         <a:buSzPct val="90000"/>
         <a:buFontTx/>
         <a:buBlip>
-          <a:blip r:embed="rId22"/>
+          <a:blip r:embed="rId21"/>
         </a:buBlip>
         <a:defRPr sz="2400" kern="1200">
           <a:gradFill>
@@ -9411,7 +9389,7 @@
         <a:buSzPct val="90000"/>
         <a:buFontTx/>
         <a:buBlip>
-          <a:blip r:embed="rId22"/>
+          <a:blip r:embed="rId21"/>
         </a:buBlip>
         <a:defRPr sz="2000" kern="1200">
           <a:gradFill>
@@ -9440,7 +9418,7 @@
         <a:buSzPct val="90000"/>
         <a:buFontTx/>
         <a:buBlip>
-          <a:blip r:embed="rId22"/>
+          <a:blip r:embed="rId21"/>
         </a:buBlip>
         <a:defRPr sz="2000" kern="1200">
           <a:gradFill>
@@ -9627,6 +9605,11 @@
         <a:blipFill dpi="0" rotWithShape="1">
           <a:blip r:embed="rId4">
             <a:lum/>
+            <a:extLst>
+              <a:ext uri="{28A0092B-C50C-407E-A947-70E740481C1C}">
+                <a14:useLocalDpi xmlns:a14="http://schemas.microsoft.com/office/drawing/2010/main"/>
+              </a:ext>
+            </a:extLst>
           </a:blip>
           <a:srcRect/>
           <a:stretch>
@@ -9757,13 +9740,13 @@
     <p:sldLayoutId id="2147483681" r:id="rId1"/>
     <p:sldLayoutId id="2147483704" r:id="rId2"/>
   </p:sldLayoutIdLst>
-  <p:transition xmlns:p14="http://schemas.microsoft.com/office/powerpoint/2010/main">
+  <p:transition>
     <p:fade/>
   </p:transition>
   <p:timing>
     <p:tnLst>
       <p:par>
-        <p:cTn xmlns:p14="http://schemas.microsoft.com/office/powerpoint/2010/main" id="1" dur="indefinite" restart="never" nodeType="tmRoot"/>
+        <p:cTn id="1" dur="indefinite" restart="never" nodeType="tmRoot"/>
       </p:par>
     </p:tnLst>
   </p:timing>
@@ -10090,8 +10073,13 @@
     <p:bg bwMode="blackWhite">
       <p:bgPr>
         <a:blipFill dpi="0" rotWithShape="1">
-          <a:blip r:embed="rId21">
+          <a:blip r:embed="rId20">
             <a:lum/>
+            <a:extLst>
+              <a:ext uri="{28A0092B-C50C-407E-A947-70E740481C1C}">
+                <a14:useLocalDpi xmlns:a14="http://schemas.microsoft.com/office/drawing/2010/main"/>
+              </a:ext>
+            </a:extLst>
           </a:blip>
           <a:srcRect/>
           <a:stretch>
@@ -10234,18 +10222,17 @@
     <p:sldLayoutId id="2147483695" r:id="rId13"/>
     <p:sldLayoutId id="2147483696" r:id="rId14"/>
     <p:sldLayoutId id="2147483697" r:id="rId15"/>
-    <p:sldLayoutId id="2147483698" r:id="rId16"/>
-    <p:sldLayoutId id="2147483699" r:id="rId17"/>
-    <p:sldLayoutId id="2147483700" r:id="rId18"/>
-    <p:sldLayoutId id="2147483701" r:id="rId19"/>
+    <p:sldLayoutId id="2147483699" r:id="rId16"/>
+    <p:sldLayoutId id="2147483700" r:id="rId17"/>
+    <p:sldLayoutId id="2147483701" r:id="rId18"/>
   </p:sldLayoutIdLst>
-  <p:transition xmlns:p14="http://schemas.microsoft.com/office/powerpoint/2010/main">
+  <p:transition>
     <p:fade/>
   </p:transition>
   <p:timing>
     <p:tnLst>
       <p:par>
-        <p:cTn xmlns:p14="http://schemas.microsoft.com/office/powerpoint/2010/main" id="1" dur="indefinite" restart="never" nodeType="tmRoot"/>
+        <p:cTn id="1" dur="indefinite" restart="never" nodeType="tmRoot"/>
       </p:par>
     </p:tnLst>
   </p:timing>
@@ -10293,7 +10280,7 @@
         <a:buSzPct val="90000"/>
         <a:buFontTx/>
         <a:buBlip>
-          <a:blip r:embed="rId22"/>
+          <a:blip r:embed="rId21"/>
         </a:buBlip>
         <a:defRPr sz="3200" kern="1200">
           <a:gradFill>
@@ -10322,7 +10309,7 @@
         <a:buSzPct val="90000"/>
         <a:buFontTx/>
         <a:buBlip>
-          <a:blip r:embed="rId22"/>
+          <a:blip r:embed="rId21"/>
         </a:buBlip>
         <a:defRPr sz="2800" kern="1200">
           <a:gradFill>
@@ -10351,7 +10338,7 @@
         <a:buSzPct val="90000"/>
         <a:buFontTx/>
         <a:buBlip>
-          <a:blip r:embed="rId22"/>
+          <a:blip r:embed="rId21"/>
         </a:buBlip>
         <a:defRPr sz="2400" kern="1200">
           <a:gradFill>
@@ -10380,7 +10367,7 @@
         <a:buSzPct val="90000"/>
         <a:buFontTx/>
         <a:buBlip>
-          <a:blip r:embed="rId22"/>
+          <a:blip r:embed="rId21"/>
         </a:buBlip>
         <a:defRPr sz="2000" kern="1200">
           <a:gradFill>
@@ -10409,7 +10396,7 @@
         <a:buSzPct val="90000"/>
         <a:buFontTx/>
         <a:buBlip>
-          <a:blip r:embed="rId22"/>
+          <a:blip r:embed="rId21"/>
         </a:buBlip>
         <a:defRPr sz="2000" kern="1200">
           <a:gradFill>
@@ -10596,6 +10583,11 @@
         <a:blipFill dpi="0" rotWithShape="1">
           <a:blip r:embed="rId3">
             <a:lum/>
+            <a:extLst>
+              <a:ext uri="{28A0092B-C50C-407E-A947-70E740481C1C}">
+                <a14:useLocalDpi xmlns:a14="http://schemas.microsoft.com/office/drawing/2010/main"/>
+              </a:ext>
+            </a:extLst>
           </a:blip>
           <a:srcRect/>
           <a:stretch>
@@ -10725,13 +10717,13 @@
   <p:sldLayoutIdLst>
     <p:sldLayoutId id="2147483703" r:id="rId1"/>
   </p:sldLayoutIdLst>
-  <p:transition xmlns:p14="http://schemas.microsoft.com/office/powerpoint/2010/main">
+  <p:transition>
     <p:fade/>
   </p:transition>
   <p:timing>
     <p:tnLst>
       <p:par>
-        <p:cTn xmlns:p14="http://schemas.microsoft.com/office/powerpoint/2010/main" id="1" dur="indefinite" restart="never" nodeType="tmRoot"/>
+        <p:cTn id="1" dur="indefinite" restart="never" nodeType="tmRoot"/>
       </p:par>
     </p:tnLst>
   </p:timing>
@@ -11158,9 +11150,16 @@
   <p:clrMapOvr>
     <a:masterClrMapping/>
   </p:clrMapOvr>
-  <p:transition xmlns:p14="http://schemas.microsoft.com/office/powerpoint/2010/main">
+  <p:transition>
     <p:fade/>
   </p:transition>
+  <p:timing>
+    <p:tnLst>
+      <p:par>
+        <p:cTn id="1" dur="indefinite" restart="never" nodeType="tmRoot"/>
+      </p:par>
+    </p:tnLst>
+  </p:timing>
 </p:sld>
 </file>
 
@@ -11266,7 +11265,7 @@
   <p:clrMapOvr>
     <a:masterClrMapping/>
   </p:clrMapOvr>
-  <p:transition xmlns:p14="http://schemas.microsoft.com/office/powerpoint/2010/main">
+  <p:transition>
     <p:fade/>
   </p:transition>
 </p:sld>
@@ -11400,9 +11399,16 @@
   <p:clrMapOvr>
     <a:masterClrMapping/>
   </p:clrMapOvr>
-  <p:transition xmlns:p14="http://schemas.microsoft.com/office/powerpoint/2010/main">
+  <p:transition>
     <p:fade/>
   </p:transition>
+  <p:timing>
+    <p:tnLst>
+      <p:par>
+        <p:cTn id="1" dur="indefinite" restart="never" nodeType="tmRoot"/>
+      </p:par>
+    </p:tnLst>
+  </p:timing>
 </p:sld>
 </file>
 
@@ -11505,13 +11511,13 @@
   <p:clrMapOvr>
     <a:masterClrMapping/>
   </p:clrMapOvr>
-  <p:transition xmlns:p14="http://schemas.microsoft.com/office/powerpoint/2010/main">
+  <p:transition>
     <p:fade/>
   </p:transition>
   <p:timing>
     <p:tnLst>
       <p:par>
-        <p:cTn xmlns:p14="http://schemas.microsoft.com/office/powerpoint/2010/main" id="1" dur="indefinite" restart="never" nodeType="tmRoot"/>
+        <p:cTn id="1" dur="indefinite" restart="never" nodeType="tmRoot"/>
       </p:par>
     </p:tnLst>
   </p:timing>
@@ -11620,7 +11626,7 @@
   <p:clrMapOvr>
     <a:masterClrMapping/>
   </p:clrMapOvr>
-  <p:transition xmlns:p14="http://schemas.microsoft.com/office/powerpoint/2010/main">
+  <p:transition>
     <p:fade/>
   </p:transition>
 </p:sld>
@@ -11729,13 +11735,13 @@
   <p:clrMapOvr>
     <a:masterClrMapping/>
   </p:clrMapOvr>
-  <p:transition xmlns:p14="http://schemas.microsoft.com/office/powerpoint/2010/main">
+  <p:transition>
     <p:fade/>
   </p:transition>
   <p:timing>
     <p:tnLst>
       <p:par>
-        <p:cTn xmlns:p14="http://schemas.microsoft.com/office/powerpoint/2010/main" id="1" dur="indefinite" restart="never" nodeType="tmRoot"/>
+        <p:cTn id="1" dur="indefinite" restart="never" nodeType="tmRoot"/>
       </p:par>
     </p:tnLst>
   </p:timing>
@@ -12153,7 +12159,13 @@
           <p:nvPr/>
         </p:nvPicPr>
         <p:blipFill>
-          <a:blip r:embed="rId2"/>
+          <a:blip r:embed="rId2" cstate="print">
+            <a:extLst>
+              <a:ext uri="{28A0092B-C50C-407E-A947-70E740481C1C}">
+                <a14:useLocalDpi xmlns:a14="http://schemas.microsoft.com/office/drawing/2010/main"/>
+              </a:ext>
+            </a:extLst>
+          </a:blip>
           <a:stretch>
             <a:fillRect/>
           </a:stretch>
@@ -12177,7 +12189,13 @@
           <p:nvPr/>
         </p:nvPicPr>
         <p:blipFill>
-          <a:blip r:embed="rId3"/>
+          <a:blip r:embed="rId3" cstate="print">
+            <a:extLst>
+              <a:ext uri="{28A0092B-C50C-407E-A947-70E740481C1C}">
+                <a14:useLocalDpi xmlns:a14="http://schemas.microsoft.com/office/drawing/2010/main"/>
+              </a:ext>
+            </a:extLst>
+          </a:blip>
           <a:stretch>
             <a:fillRect/>
           </a:stretch>
@@ -12201,7 +12219,13 @@
           <p:nvPr/>
         </p:nvPicPr>
         <p:blipFill>
-          <a:blip r:embed="rId4"/>
+          <a:blip r:embed="rId4" cstate="print">
+            <a:extLst>
+              <a:ext uri="{28A0092B-C50C-407E-A947-70E740481C1C}">
+                <a14:useLocalDpi xmlns:a14="http://schemas.microsoft.com/office/drawing/2010/main"/>
+              </a:ext>
+            </a:extLst>
+          </a:blip>
           <a:stretch>
             <a:fillRect/>
           </a:stretch>
@@ -12225,7 +12249,13 @@
           <p:nvPr/>
         </p:nvPicPr>
         <p:blipFill>
-          <a:blip r:embed="rId5"/>
+          <a:blip r:embed="rId5" cstate="print">
+            <a:extLst>
+              <a:ext uri="{28A0092B-C50C-407E-A947-70E740481C1C}">
+                <a14:useLocalDpi xmlns:a14="http://schemas.microsoft.com/office/drawing/2010/main"/>
+              </a:ext>
+            </a:extLst>
+          </a:blip>
           <a:stretch>
             <a:fillRect/>
           </a:stretch>
@@ -12249,7 +12279,13 @@
           <p:nvPr/>
         </p:nvPicPr>
         <p:blipFill>
-          <a:blip r:embed="rId6"/>
+          <a:blip r:embed="rId6" cstate="print">
+            <a:extLst>
+              <a:ext uri="{28A0092B-C50C-407E-A947-70E740481C1C}">
+                <a14:useLocalDpi xmlns:a14="http://schemas.microsoft.com/office/drawing/2010/main"/>
+              </a:ext>
+            </a:extLst>
+          </a:blip>
           <a:stretch>
             <a:fillRect/>
           </a:stretch>
@@ -12273,7 +12309,13 @@
           <p:nvPr/>
         </p:nvPicPr>
         <p:blipFill>
-          <a:blip r:embed="rId7"/>
+          <a:blip r:embed="rId7" cstate="print">
+            <a:extLst>
+              <a:ext uri="{28A0092B-C50C-407E-A947-70E740481C1C}">
+                <a14:useLocalDpi xmlns:a14="http://schemas.microsoft.com/office/drawing/2010/main"/>
+              </a:ext>
+            </a:extLst>
+          </a:blip>
           <a:stretch>
             <a:fillRect/>
           </a:stretch>
@@ -12297,7 +12339,13 @@
           <p:nvPr/>
         </p:nvPicPr>
         <p:blipFill>
-          <a:blip r:embed="rId2"/>
+          <a:blip r:embed="rId8" cstate="print">
+            <a:extLst>
+              <a:ext uri="{28A0092B-C50C-407E-A947-70E740481C1C}">
+                <a14:useLocalDpi xmlns:a14="http://schemas.microsoft.com/office/drawing/2010/main"/>
+              </a:ext>
+            </a:extLst>
+          </a:blip>
           <a:stretch>
             <a:fillRect/>
           </a:stretch>
@@ -12321,7 +12369,13 @@
           <p:nvPr/>
         </p:nvPicPr>
         <p:blipFill>
-          <a:blip r:embed="rId6"/>
+          <a:blip r:embed="rId9" cstate="print">
+            <a:extLst>
+              <a:ext uri="{28A0092B-C50C-407E-A947-70E740481C1C}">
+                <a14:useLocalDpi xmlns:a14="http://schemas.microsoft.com/office/drawing/2010/main"/>
+              </a:ext>
+            </a:extLst>
+          </a:blip>
           <a:stretch>
             <a:fillRect/>
           </a:stretch>
@@ -12346,13 +12400,13 @@
   <p:clrMapOvr>
     <a:masterClrMapping/>
   </p:clrMapOvr>
-  <p:transition xmlns:p14="http://schemas.microsoft.com/office/powerpoint/2010/main">
+  <p:transition>
     <p:fade/>
   </p:transition>
   <p:timing>
     <p:tnLst>
       <p:par>
-        <p:cTn xmlns:p14="http://schemas.microsoft.com/office/powerpoint/2010/main" id="1" dur="indefinite" restart="never" nodeType="tmRoot"/>
+        <p:cTn id="1" dur="indefinite" restart="never" nodeType="tmRoot"/>
       </p:par>
     </p:tnLst>
   </p:timing>
@@ -12409,13 +12463,13 @@
   <p:clrMapOvr>
     <a:masterClrMapping/>
   </p:clrMapOvr>
-  <p:transition xmlns:p14="http://schemas.microsoft.com/office/powerpoint/2010/main">
+  <p:transition>
     <p:fade/>
   </p:transition>
   <p:timing>
     <p:tnLst>
       <p:par>
-        <p:cTn xmlns:p14="http://schemas.microsoft.com/office/powerpoint/2010/main" id="1" dur="indefinite" restart="never" nodeType="tmRoot"/>
+        <p:cTn id="1" dur="indefinite" restart="never" nodeType="tmRoot"/>
       </p:par>
     </p:tnLst>
   </p:timing>
@@ -12517,13 +12571,13 @@
   <p:clrMapOvr>
     <a:masterClrMapping/>
   </p:clrMapOvr>
-  <p:transition xmlns:p14="http://schemas.microsoft.com/office/powerpoint/2010/main">
+  <p:transition>
     <p:fade/>
   </p:transition>
   <p:timing>
     <p:tnLst>
       <p:par>
-        <p:cTn xmlns:p14="http://schemas.microsoft.com/office/powerpoint/2010/main" id="1" dur="indefinite" restart="never" nodeType="tmRoot"/>
+        <p:cTn id="1" dur="indefinite" restart="never" nodeType="tmRoot"/>
       </p:par>
     </p:tnLst>
   </p:timing>

</xml_diff>